<commit_message>
Wed, Oct 31, 2018  8:51:34 PM
</commit_message>
<xml_diff>
--- a/Journal Club/Phase-Contrast and Elastography/MRE - Grant Roberts.pptx
+++ b/Journal Club/Phase-Contrast and Elastography/MRE - Grant Roberts.pptx
@@ -15,12 +15,25 @@
     <p:sldMasterId id="2147483788" r:id="rId11"/>
     <p:sldMasterId id="2147483800" r:id="rId12"/>
   </p:sldMasterIdLst>
+  <p:notesMasterIdLst>
+    <p:notesMasterId r:id="rId28"/>
+  </p:notesMasterIdLst>
   <p:sldIdLst>
     <p:sldId id="256" r:id="rId13"/>
     <p:sldId id="258" r:id="rId14"/>
     <p:sldId id="260" r:id="rId15"/>
-    <p:sldId id="261" r:id="rId16"/>
-    <p:sldId id="262" r:id="rId17"/>
+    <p:sldId id="266" r:id="rId16"/>
+    <p:sldId id="264" r:id="rId17"/>
+    <p:sldId id="265" r:id="rId18"/>
+    <p:sldId id="269" r:id="rId19"/>
+    <p:sldId id="261" r:id="rId20"/>
+    <p:sldId id="262" r:id="rId21"/>
+    <p:sldId id="271" r:id="rId22"/>
+    <p:sldId id="272" r:id="rId23"/>
+    <p:sldId id="273" r:id="rId24"/>
+    <p:sldId id="267" r:id="rId25"/>
+    <p:sldId id="268" r:id="rId26"/>
+    <p:sldId id="270" r:id="rId27"/>
   </p:sldIdLst>
   <p:sldSz cx="12192000" cy="6858000"/>
   <p:notesSz cx="6858000" cy="9144000"/>
@@ -149,7 +162,574 @@
       </a:defRPr>
     </a:lvl9pPr>
   </p:defaultTextStyle>
+  <p:extLst>
+    <p:ext uri="{EFAFB233-063F-42B5-8137-9DF3F51BA10A}">
+      <p15:sldGuideLst xmlns:p15="http://schemas.microsoft.com/office/powerpoint/2012/main"/>
+    </p:ext>
+  </p:extLst>
 </p:presentation>
+</file>
+
+<file path=ppt/notesMasters/notesMaster1.xml><?xml version="1.0" encoding="utf-8"?>
+<p:notesMaster xmlns:a="http://schemas.openxmlformats.org/drawingml/2006/main" xmlns:r="http://schemas.openxmlformats.org/officeDocument/2006/relationships" xmlns:p="http://schemas.openxmlformats.org/presentationml/2006/main">
+  <p:cSld>
+    <p:bg>
+      <p:bgRef idx="1001">
+        <a:schemeClr val="bg1"/>
+      </p:bgRef>
+    </p:bg>
+    <p:spTree>
+      <p:nvGrpSpPr>
+        <p:cNvPr id="1" name=""/>
+        <p:cNvGrpSpPr/>
+        <p:nvPr/>
+      </p:nvGrpSpPr>
+      <p:grpSpPr>
+        <a:xfrm>
+          <a:off x="0" y="0"/>
+          <a:ext cx="0" cy="0"/>
+          <a:chOff x="0" y="0"/>
+          <a:chExt cx="0" cy="0"/>
+        </a:xfrm>
+      </p:grpSpPr>
+      <p:sp>
+        <p:nvSpPr>
+          <p:cNvPr id="2" name="Header Placeholder 1"/>
+          <p:cNvSpPr>
+            <a:spLocks noGrp="1"/>
+          </p:cNvSpPr>
+          <p:nvPr>
+            <p:ph type="hdr" sz="quarter"/>
+          </p:nvPr>
+        </p:nvSpPr>
+        <p:spPr>
+          <a:xfrm>
+            <a:off x="0" y="0"/>
+            <a:ext cx="2971800" cy="458788"/>
+          </a:xfrm>
+          <a:prstGeom prst="rect">
+            <a:avLst/>
+          </a:prstGeom>
+        </p:spPr>
+        <p:txBody>
+          <a:bodyPr vert="horz" lIns="91440" tIns="45720" rIns="91440" bIns="45720" rtlCol="0"/>
+          <a:lstStyle>
+            <a:lvl1pPr algn="l">
+              <a:defRPr sz="1200"/>
+            </a:lvl1pPr>
+          </a:lstStyle>
+          <a:p>
+            <a:endParaRPr lang="en-US"/>
+          </a:p>
+        </p:txBody>
+      </p:sp>
+      <p:sp>
+        <p:nvSpPr>
+          <p:cNvPr id="3" name="Date Placeholder 2"/>
+          <p:cNvSpPr>
+            <a:spLocks noGrp="1"/>
+          </p:cNvSpPr>
+          <p:nvPr>
+            <p:ph type="dt" idx="1"/>
+          </p:nvPr>
+        </p:nvSpPr>
+        <p:spPr>
+          <a:xfrm>
+            <a:off x="3884613" y="0"/>
+            <a:ext cx="2971800" cy="458788"/>
+          </a:xfrm>
+          <a:prstGeom prst="rect">
+            <a:avLst/>
+          </a:prstGeom>
+        </p:spPr>
+        <p:txBody>
+          <a:bodyPr vert="horz" lIns="91440" tIns="45720" rIns="91440" bIns="45720" rtlCol="0"/>
+          <a:lstStyle>
+            <a:lvl1pPr algn="r">
+              <a:defRPr sz="1200"/>
+            </a:lvl1pPr>
+          </a:lstStyle>
+          <a:p>
+            <a:fld id="{C26C7A14-4AF1-4949-87C7-41B7B5F516CF}" type="datetimeFigureOut">
+              <a:rPr lang="en-US" smtClean="0"/>
+              <a:t>10/31/2018</a:t>
+            </a:fld>
+            <a:endParaRPr lang="en-US"/>
+          </a:p>
+        </p:txBody>
+      </p:sp>
+      <p:sp>
+        <p:nvSpPr>
+          <p:cNvPr id="4" name="Slide Image Placeholder 3"/>
+          <p:cNvSpPr>
+            <a:spLocks noGrp="1" noRot="1" noChangeAspect="1"/>
+          </p:cNvSpPr>
+          <p:nvPr>
+            <p:ph type="sldImg" idx="2"/>
+          </p:nvPr>
+        </p:nvSpPr>
+        <p:spPr>
+          <a:xfrm>
+            <a:off x="685800" y="1143000"/>
+            <a:ext cx="5486400" cy="3086100"/>
+          </a:xfrm>
+          <a:prstGeom prst="rect">
+            <a:avLst/>
+          </a:prstGeom>
+          <a:noFill/>
+          <a:ln w="12700">
+            <a:solidFill>
+              <a:prstClr val="black"/>
+            </a:solidFill>
+          </a:ln>
+        </p:spPr>
+        <p:txBody>
+          <a:bodyPr vert="horz" lIns="91440" tIns="45720" rIns="91440" bIns="45720" rtlCol="0" anchor="ctr"/>
+          <a:lstStyle/>
+          <a:p>
+            <a:endParaRPr lang="en-US"/>
+          </a:p>
+        </p:txBody>
+      </p:sp>
+      <p:sp>
+        <p:nvSpPr>
+          <p:cNvPr id="5" name="Notes Placeholder 4"/>
+          <p:cNvSpPr>
+            <a:spLocks noGrp="1"/>
+          </p:cNvSpPr>
+          <p:nvPr>
+            <p:ph type="body" sz="quarter" idx="3"/>
+          </p:nvPr>
+        </p:nvSpPr>
+        <p:spPr>
+          <a:xfrm>
+            <a:off x="685800" y="4400550"/>
+            <a:ext cx="5486400" cy="3600450"/>
+          </a:xfrm>
+          <a:prstGeom prst="rect">
+            <a:avLst/>
+          </a:prstGeom>
+        </p:spPr>
+        <p:txBody>
+          <a:bodyPr vert="horz" lIns="91440" tIns="45720" rIns="91440" bIns="45720" rtlCol="0"/>
+          <a:lstStyle/>
+          <a:p>
+            <a:pPr lvl="0"/>
+            <a:r>
+              <a:rPr lang="en-US" smtClean="0"/>
+              <a:t>Edit Master text styles</a:t>
+            </a:r>
+          </a:p>
+          <a:p>
+            <a:pPr lvl="1"/>
+            <a:r>
+              <a:rPr lang="en-US" smtClean="0"/>
+              <a:t>Second level</a:t>
+            </a:r>
+          </a:p>
+          <a:p>
+            <a:pPr lvl="2"/>
+            <a:r>
+              <a:rPr lang="en-US" smtClean="0"/>
+              <a:t>Third level</a:t>
+            </a:r>
+          </a:p>
+          <a:p>
+            <a:pPr lvl="3"/>
+            <a:r>
+              <a:rPr lang="en-US" smtClean="0"/>
+              <a:t>Fourth level</a:t>
+            </a:r>
+          </a:p>
+          <a:p>
+            <a:pPr lvl="4"/>
+            <a:r>
+              <a:rPr lang="en-US" smtClean="0"/>
+              <a:t>Fifth level</a:t>
+            </a:r>
+            <a:endParaRPr lang="en-US"/>
+          </a:p>
+        </p:txBody>
+      </p:sp>
+      <p:sp>
+        <p:nvSpPr>
+          <p:cNvPr id="6" name="Footer Placeholder 5"/>
+          <p:cNvSpPr>
+            <a:spLocks noGrp="1"/>
+          </p:cNvSpPr>
+          <p:nvPr>
+            <p:ph type="ftr" sz="quarter" idx="4"/>
+          </p:nvPr>
+        </p:nvSpPr>
+        <p:spPr>
+          <a:xfrm>
+            <a:off x="0" y="8685213"/>
+            <a:ext cx="2971800" cy="458787"/>
+          </a:xfrm>
+          <a:prstGeom prst="rect">
+            <a:avLst/>
+          </a:prstGeom>
+        </p:spPr>
+        <p:txBody>
+          <a:bodyPr vert="horz" lIns="91440" tIns="45720" rIns="91440" bIns="45720" rtlCol="0" anchor="b"/>
+          <a:lstStyle>
+            <a:lvl1pPr algn="l">
+              <a:defRPr sz="1200"/>
+            </a:lvl1pPr>
+          </a:lstStyle>
+          <a:p>
+            <a:endParaRPr lang="en-US"/>
+          </a:p>
+        </p:txBody>
+      </p:sp>
+      <p:sp>
+        <p:nvSpPr>
+          <p:cNvPr id="7" name="Slide Number Placeholder 6"/>
+          <p:cNvSpPr>
+            <a:spLocks noGrp="1"/>
+          </p:cNvSpPr>
+          <p:nvPr>
+            <p:ph type="sldNum" sz="quarter" idx="5"/>
+          </p:nvPr>
+        </p:nvSpPr>
+        <p:spPr>
+          <a:xfrm>
+            <a:off x="3884613" y="8685213"/>
+            <a:ext cx="2971800" cy="458787"/>
+          </a:xfrm>
+          <a:prstGeom prst="rect">
+            <a:avLst/>
+          </a:prstGeom>
+        </p:spPr>
+        <p:txBody>
+          <a:bodyPr vert="horz" lIns="91440" tIns="45720" rIns="91440" bIns="45720" rtlCol="0" anchor="b"/>
+          <a:lstStyle>
+            <a:lvl1pPr algn="r">
+              <a:defRPr sz="1200"/>
+            </a:lvl1pPr>
+          </a:lstStyle>
+          <a:p>
+            <a:fld id="{B92B1DC2-E370-467C-801E-2EC2A621CA0E}" type="slidenum">
+              <a:rPr lang="en-US" smtClean="0"/>
+              <a:t>‹#›</a:t>
+            </a:fld>
+            <a:endParaRPr lang="en-US"/>
+          </a:p>
+        </p:txBody>
+      </p:sp>
+    </p:spTree>
+    <p:extLst>
+      <p:ext uri="{BB962C8B-B14F-4D97-AF65-F5344CB8AC3E}">
+        <p14:creationId xmlns:p14="http://schemas.microsoft.com/office/powerpoint/2010/main" val="2355340885"/>
+      </p:ext>
+    </p:extLst>
+  </p:cSld>
+  <p:clrMap bg1="lt1" tx1="dk1" bg2="lt2" tx2="dk2" accent1="accent1" accent2="accent2" accent3="accent3" accent4="accent4" accent5="accent5" accent6="accent6" hlink="hlink" folHlink="folHlink"/>
+  <p:notesStyle>
+    <a:lvl1pPr marL="0" algn="l" defTabSz="914400" rtl="0" eaLnBrk="1" latinLnBrk="0" hangingPunct="1">
+      <a:defRPr sz="1200" kern="1200">
+        <a:solidFill>
+          <a:schemeClr val="tx1"/>
+        </a:solidFill>
+        <a:latin typeface="+mn-lt"/>
+        <a:ea typeface="+mn-ea"/>
+        <a:cs typeface="+mn-cs"/>
+      </a:defRPr>
+    </a:lvl1pPr>
+    <a:lvl2pPr marL="457200" algn="l" defTabSz="914400" rtl="0" eaLnBrk="1" latinLnBrk="0" hangingPunct="1">
+      <a:defRPr sz="1200" kern="1200">
+        <a:solidFill>
+          <a:schemeClr val="tx1"/>
+        </a:solidFill>
+        <a:latin typeface="+mn-lt"/>
+        <a:ea typeface="+mn-ea"/>
+        <a:cs typeface="+mn-cs"/>
+      </a:defRPr>
+    </a:lvl2pPr>
+    <a:lvl3pPr marL="914400" algn="l" defTabSz="914400" rtl="0" eaLnBrk="1" latinLnBrk="0" hangingPunct="1">
+      <a:defRPr sz="1200" kern="1200">
+        <a:solidFill>
+          <a:schemeClr val="tx1"/>
+        </a:solidFill>
+        <a:latin typeface="+mn-lt"/>
+        <a:ea typeface="+mn-ea"/>
+        <a:cs typeface="+mn-cs"/>
+      </a:defRPr>
+    </a:lvl3pPr>
+    <a:lvl4pPr marL="1371600" algn="l" defTabSz="914400" rtl="0" eaLnBrk="1" latinLnBrk="0" hangingPunct="1">
+      <a:defRPr sz="1200" kern="1200">
+        <a:solidFill>
+          <a:schemeClr val="tx1"/>
+        </a:solidFill>
+        <a:latin typeface="+mn-lt"/>
+        <a:ea typeface="+mn-ea"/>
+        <a:cs typeface="+mn-cs"/>
+      </a:defRPr>
+    </a:lvl4pPr>
+    <a:lvl5pPr marL="1828800" algn="l" defTabSz="914400" rtl="0" eaLnBrk="1" latinLnBrk="0" hangingPunct="1">
+      <a:defRPr sz="1200" kern="1200">
+        <a:solidFill>
+          <a:schemeClr val="tx1"/>
+        </a:solidFill>
+        <a:latin typeface="+mn-lt"/>
+        <a:ea typeface="+mn-ea"/>
+        <a:cs typeface="+mn-cs"/>
+      </a:defRPr>
+    </a:lvl5pPr>
+    <a:lvl6pPr marL="2286000" algn="l" defTabSz="914400" rtl="0" eaLnBrk="1" latinLnBrk="0" hangingPunct="1">
+      <a:defRPr sz="1200" kern="1200">
+        <a:solidFill>
+          <a:schemeClr val="tx1"/>
+        </a:solidFill>
+        <a:latin typeface="+mn-lt"/>
+        <a:ea typeface="+mn-ea"/>
+        <a:cs typeface="+mn-cs"/>
+      </a:defRPr>
+    </a:lvl6pPr>
+    <a:lvl7pPr marL="2743200" algn="l" defTabSz="914400" rtl="0" eaLnBrk="1" latinLnBrk="0" hangingPunct="1">
+      <a:defRPr sz="1200" kern="1200">
+        <a:solidFill>
+          <a:schemeClr val="tx1"/>
+        </a:solidFill>
+        <a:latin typeface="+mn-lt"/>
+        <a:ea typeface="+mn-ea"/>
+        <a:cs typeface="+mn-cs"/>
+      </a:defRPr>
+    </a:lvl7pPr>
+    <a:lvl8pPr marL="3200400" algn="l" defTabSz="914400" rtl="0" eaLnBrk="1" latinLnBrk="0" hangingPunct="1">
+      <a:defRPr sz="1200" kern="1200">
+        <a:solidFill>
+          <a:schemeClr val="tx1"/>
+        </a:solidFill>
+        <a:latin typeface="+mn-lt"/>
+        <a:ea typeface="+mn-ea"/>
+        <a:cs typeface="+mn-cs"/>
+      </a:defRPr>
+    </a:lvl8pPr>
+    <a:lvl9pPr marL="3657600" algn="l" defTabSz="914400" rtl="0" eaLnBrk="1" latinLnBrk="0" hangingPunct="1">
+      <a:defRPr sz="1200" kern="1200">
+        <a:solidFill>
+          <a:schemeClr val="tx1"/>
+        </a:solidFill>
+        <a:latin typeface="+mn-lt"/>
+        <a:ea typeface="+mn-ea"/>
+        <a:cs typeface="+mn-cs"/>
+      </a:defRPr>
+    </a:lvl9pPr>
+  </p:notesStyle>
+</p:notesMaster>
+</file>
+
+<file path=ppt/notesSlides/notesSlide1.xml><?xml version="1.0" encoding="utf-8"?>
+<p:notes xmlns:a="http://schemas.openxmlformats.org/drawingml/2006/main" xmlns:r="http://schemas.openxmlformats.org/officeDocument/2006/relationships" xmlns:p="http://schemas.openxmlformats.org/presentationml/2006/main">
+  <p:cSld>
+    <p:spTree>
+      <p:nvGrpSpPr>
+        <p:cNvPr id="1" name=""/>
+        <p:cNvGrpSpPr/>
+        <p:nvPr/>
+      </p:nvGrpSpPr>
+      <p:grpSpPr>
+        <a:xfrm>
+          <a:off x="0" y="0"/>
+          <a:ext cx="0" cy="0"/>
+          <a:chOff x="0" y="0"/>
+          <a:chExt cx="0" cy="0"/>
+        </a:xfrm>
+      </p:grpSpPr>
+      <p:sp>
+        <p:nvSpPr>
+          <p:cNvPr id="2" name="Slide Image Placeholder 1"/>
+          <p:cNvSpPr>
+            <a:spLocks noGrp="1" noRot="1" noChangeAspect="1"/>
+          </p:cNvSpPr>
+          <p:nvPr>
+            <p:ph type="sldImg"/>
+          </p:nvPr>
+        </p:nvSpPr>
+        <p:spPr/>
+      </p:sp>
+      <p:sp>
+        <p:nvSpPr>
+          <p:cNvPr id="3" name="Notes Placeholder 2"/>
+          <p:cNvSpPr>
+            <a:spLocks noGrp="1"/>
+          </p:cNvSpPr>
+          <p:nvPr>
+            <p:ph type="body" idx="1"/>
+          </p:nvPr>
+        </p:nvSpPr>
+        <p:spPr/>
+        <p:txBody>
+          <a:bodyPr/>
+          <a:lstStyle/>
+          <a:p>
+            <a:r>
+              <a:rPr lang="en-US" dirty="0" smtClean="0"/>
+              <a:t>Mechanic</a:t>
+            </a:r>
+            <a:r>
+              <a:rPr lang="en-US" baseline="0" dirty="0" smtClean="0"/>
+              <a:t>al properties of tissues, specifically stiffness, provide valuable information about disease processes. For years, physicians have been using sense of touch (palpation) to aid in diagnosis by literally feeling the stiffness of organs, most markedly in differentiating malignant tumors (harder) and benign tumors (softer). However, there are other disease which change tissue stiffness that cannot be palpated non-invasively, such as stiffness of the brain in Alzheimer patients or liver fibrosis. MRE provides a way to non-invasively and quantitatively assess mechanical properties of tissues. </a:t>
+            </a:r>
+            <a:endParaRPr lang="en-US" dirty="0"/>
+          </a:p>
+        </p:txBody>
+      </p:sp>
+      <p:sp>
+        <p:nvSpPr>
+          <p:cNvPr id="4" name="Slide Number Placeholder 3"/>
+          <p:cNvSpPr>
+            <a:spLocks noGrp="1"/>
+          </p:cNvSpPr>
+          <p:nvPr>
+            <p:ph type="sldNum" sz="quarter" idx="10"/>
+          </p:nvPr>
+        </p:nvSpPr>
+        <p:spPr/>
+        <p:txBody>
+          <a:bodyPr/>
+          <a:lstStyle/>
+          <a:p>
+            <a:fld id="{B92B1DC2-E370-467C-801E-2EC2A621CA0E}" type="slidenum">
+              <a:rPr lang="en-US" smtClean="0"/>
+              <a:t>3</a:t>
+            </a:fld>
+            <a:endParaRPr lang="en-US"/>
+          </a:p>
+        </p:txBody>
+      </p:sp>
+    </p:spTree>
+    <p:extLst>
+      <p:ext uri="{BB962C8B-B14F-4D97-AF65-F5344CB8AC3E}">
+        <p14:creationId xmlns:p14="http://schemas.microsoft.com/office/powerpoint/2010/main" val="710464293"/>
+      </p:ext>
+    </p:extLst>
+  </p:cSld>
+  <p:clrMapOvr>
+    <a:masterClrMapping/>
+  </p:clrMapOvr>
+</p:notes>
+</file>
+
+<file path=ppt/notesSlides/notesSlide2.xml><?xml version="1.0" encoding="utf-8"?>
+<p:notes xmlns:a="http://schemas.openxmlformats.org/drawingml/2006/main" xmlns:r="http://schemas.openxmlformats.org/officeDocument/2006/relationships" xmlns:p="http://schemas.openxmlformats.org/presentationml/2006/main">
+  <p:cSld>
+    <p:spTree>
+      <p:nvGrpSpPr>
+        <p:cNvPr id="1" name=""/>
+        <p:cNvGrpSpPr/>
+        <p:nvPr/>
+      </p:nvGrpSpPr>
+      <p:grpSpPr>
+        <a:xfrm>
+          <a:off x="0" y="0"/>
+          <a:ext cx="0" cy="0"/>
+          <a:chOff x="0" y="0"/>
+          <a:chExt cx="0" cy="0"/>
+        </a:xfrm>
+      </p:grpSpPr>
+      <p:sp>
+        <p:nvSpPr>
+          <p:cNvPr id="2" name="Slide Image Placeholder 1"/>
+          <p:cNvSpPr>
+            <a:spLocks noGrp="1" noRot="1" noChangeAspect="1"/>
+          </p:cNvSpPr>
+          <p:nvPr>
+            <p:ph type="sldImg"/>
+          </p:nvPr>
+        </p:nvSpPr>
+        <p:spPr/>
+      </p:sp>
+      <p:sp>
+        <p:nvSpPr>
+          <p:cNvPr id="3" name="Notes Placeholder 2"/>
+          <p:cNvSpPr>
+            <a:spLocks noGrp="1"/>
+          </p:cNvSpPr>
+          <p:nvPr>
+            <p:ph type="body" idx="1"/>
+          </p:nvPr>
+        </p:nvSpPr>
+        <p:spPr/>
+        <p:txBody>
+          <a:bodyPr/>
+          <a:lstStyle/>
+          <a:p>
+            <a:pPr marL="0" marR="0" lvl="0" indent="0" algn="l" defTabSz="914400" rtl="0" eaLnBrk="1" fontAlgn="auto" latinLnBrk="0" hangingPunct="1">
+              <a:lnSpc>
+                <a:spcPct val="100000"/>
+              </a:lnSpc>
+              <a:spcBef>
+                <a:spcPts val="0"/>
+              </a:spcBef>
+              <a:spcAft>
+                <a:spcPts val="0"/>
+              </a:spcAft>
+              <a:buClrTx/>
+              <a:buSzTx/>
+              <a:buFontTx/>
+              <a:buNone/>
+              <a:tabLst/>
+              <a:defRPr/>
+            </a:pPr>
+            <a:r>
+              <a:rPr lang="en-US" dirty="0" smtClean="0"/>
+              <a:t>Liver</a:t>
+            </a:r>
+            <a:r>
+              <a:rPr lang="en-US" baseline="0" dirty="0" smtClean="0"/>
+              <a:t> fibrosis can be caused by a number of diseases, such as Hepatitis A,B,C, alcoholism, portal vein thrombosis, non-fatty liver disease, and many other diseases. If left untreated, this will eventually lead to non-reversible </a:t>
+            </a:r>
+            <a:r>
+              <a:rPr lang="en-US" baseline="0" dirty="0" err="1" smtClean="0"/>
+              <a:t>chirrosis</a:t>
+            </a:r>
+            <a:r>
+              <a:rPr lang="en-US" baseline="0" dirty="0" smtClean="0"/>
+              <a:t>. But, if detected early enough, can be reversible.</a:t>
+            </a:r>
+            <a:endParaRPr lang="en-US" dirty="0" smtClean="0"/>
+          </a:p>
+          <a:p>
+            <a:endParaRPr lang="en-US" dirty="0"/>
+          </a:p>
+        </p:txBody>
+      </p:sp>
+      <p:sp>
+        <p:nvSpPr>
+          <p:cNvPr id="4" name="Slide Number Placeholder 3"/>
+          <p:cNvSpPr>
+            <a:spLocks noGrp="1"/>
+          </p:cNvSpPr>
+          <p:nvPr>
+            <p:ph type="sldNum" sz="quarter" idx="10"/>
+          </p:nvPr>
+        </p:nvSpPr>
+        <p:spPr/>
+        <p:txBody>
+          <a:bodyPr/>
+          <a:lstStyle/>
+          <a:p>
+            <a:fld id="{B92B1DC2-E370-467C-801E-2EC2A621CA0E}" type="slidenum">
+              <a:rPr lang="en-US" smtClean="0"/>
+              <a:t>4</a:t>
+            </a:fld>
+            <a:endParaRPr lang="en-US"/>
+          </a:p>
+        </p:txBody>
+      </p:sp>
+    </p:spTree>
+    <p:extLst>
+      <p:ext uri="{BB962C8B-B14F-4D97-AF65-F5344CB8AC3E}">
+        <p14:creationId xmlns:p14="http://schemas.microsoft.com/office/powerpoint/2010/main" val="1385579823"/>
+      </p:ext>
+    </p:extLst>
+  </p:cSld>
+  <p:clrMapOvr>
+    <a:masterClrMapping/>
+  </p:clrMapOvr>
+</p:notes>
 </file>
 
 <file path=ppt/slideLayouts/slideLayout1.xml><?xml version="1.0" encoding="utf-8"?>
@@ -295,7 +875,7 @@
           <a:p>
             <a:fld id="{AA5A275E-2CFF-43A0-9D08-EC684083658F}" type="datetimeFigureOut">
               <a:rPr lang="en-US" smtClean="0"/>
-              <a:t>10/30/2018</a:t>
+              <a:t>10/31/2018</a:t>
             </a:fld>
             <a:endParaRPr lang="en-US"/>
           </a:p>
@@ -675,7 +1255,7 @@
           <a:p>
             <a:fld id="{AA5A275E-2CFF-43A0-9D08-EC684083658F}" type="datetimeFigureOut">
               <a:rPr lang="en-US" smtClean="0"/>
-              <a:t>10/30/2018</a:t>
+              <a:t>10/31/2018</a:t>
             </a:fld>
             <a:endParaRPr lang="en-US"/>
           </a:p>
@@ -2703,7 +3283,7 @@
           <a:p>
             <a:fld id="{504C849D-9CF7-3F4F-9AF7-49C86D8F7A74}" type="datetimeFigureOut">
               <a:rPr lang="en-US" smtClean="0"/>
-              <a:t>10/30/2018</a:t>
+              <a:t>10/31/2018</a:t>
             </a:fld>
             <a:endParaRPr lang="en-US"/>
           </a:p>
@@ -2858,7 +3438,7 @@
           <a:p>
             <a:fld id="{504C849D-9CF7-3F4F-9AF7-49C86D8F7A74}" type="datetimeFigureOut">
               <a:rPr lang="en-US" smtClean="0"/>
-              <a:t>10/30/2018</a:t>
+              <a:t>10/31/2018</a:t>
             </a:fld>
             <a:endParaRPr lang="en-US"/>
           </a:p>
@@ -3062,7 +3642,7 @@
           <a:p>
             <a:fld id="{AA5A275E-2CFF-43A0-9D08-EC684083658F}" type="datetimeFigureOut">
               <a:rPr lang="en-US" smtClean="0"/>
-              <a:t>10/30/2018</a:t>
+              <a:t>10/31/2018</a:t>
             </a:fld>
             <a:endParaRPr lang="en-US"/>
           </a:p>
@@ -3342,7 +3922,7 @@
           <a:p>
             <a:fld id="{504C849D-9CF7-3F4F-9AF7-49C86D8F7A74}" type="datetimeFigureOut">
               <a:rPr lang="en-US" smtClean="0"/>
-              <a:t>10/30/2018</a:t>
+              <a:t>10/31/2018</a:t>
             </a:fld>
             <a:endParaRPr lang="en-US"/>
           </a:p>
@@ -3615,7 +4195,7 @@
           <a:p>
             <a:fld id="{504C849D-9CF7-3F4F-9AF7-49C86D8F7A74}" type="datetimeFigureOut">
               <a:rPr lang="en-US" smtClean="0"/>
-              <a:t>10/30/2018</a:t>
+              <a:t>10/31/2018</a:t>
             </a:fld>
             <a:endParaRPr lang="en-US"/>
           </a:p>
@@ -4022,7 +4602,7 @@
           <a:p>
             <a:fld id="{504C849D-9CF7-3F4F-9AF7-49C86D8F7A74}" type="datetimeFigureOut">
               <a:rPr lang="en-US" smtClean="0"/>
-              <a:t>10/30/2018</a:t>
+              <a:t>10/31/2018</a:t>
             </a:fld>
             <a:endParaRPr lang="en-US"/>
           </a:p>
@@ -4125,7 +4705,7 @@
           <a:p>
             <a:fld id="{504C849D-9CF7-3F4F-9AF7-49C86D8F7A74}" type="datetimeFigureOut">
               <a:rPr lang="en-US" smtClean="0"/>
-              <a:t>10/30/2018</a:t>
+              <a:t>10/31/2018</a:t>
             </a:fld>
             <a:endParaRPr lang="en-US"/>
           </a:p>
@@ -4236,7 +4816,7 @@
           <a:p>
             <a:fld id="{504C849D-9CF7-3F4F-9AF7-49C86D8F7A74}" type="datetimeFigureOut">
               <a:rPr lang="en-US" smtClean="0"/>
-              <a:t>10/30/2018</a:t>
+              <a:t>10/31/2018</a:t>
             </a:fld>
             <a:endParaRPr lang="en-US"/>
           </a:p>
@@ -4498,7 +5078,7 @@
           <a:p>
             <a:fld id="{504C849D-9CF7-3F4F-9AF7-49C86D8F7A74}" type="datetimeFigureOut">
               <a:rPr lang="en-US" smtClean="0"/>
-              <a:t>10/30/2018</a:t>
+              <a:t>10/31/2018</a:t>
             </a:fld>
             <a:endParaRPr lang="en-US"/>
           </a:p>
@@ -4740,7 +5320,7 @@
           <a:p>
             <a:fld id="{504C849D-9CF7-3F4F-9AF7-49C86D8F7A74}" type="datetimeFigureOut">
               <a:rPr lang="en-US" smtClean="0"/>
-              <a:t>10/30/2018</a:t>
+              <a:t>10/31/2018</a:t>
             </a:fld>
             <a:endParaRPr lang="en-US"/>
           </a:p>
@@ -4895,7 +5475,7 @@
           <a:p>
             <a:fld id="{504C849D-9CF7-3F4F-9AF7-49C86D8F7A74}" type="datetimeFigureOut">
               <a:rPr lang="en-US" smtClean="0"/>
-              <a:t>10/30/2018</a:t>
+              <a:t>10/31/2018</a:t>
             </a:fld>
             <a:endParaRPr lang="en-US"/>
           </a:p>
@@ -5060,7 +5640,7 @@
           <a:p>
             <a:fld id="{504C849D-9CF7-3F4F-9AF7-49C86D8F7A74}" type="datetimeFigureOut">
               <a:rPr lang="en-US" smtClean="0"/>
-              <a:t>10/30/2018</a:t>
+              <a:t>10/31/2018</a:t>
             </a:fld>
             <a:endParaRPr lang="en-US"/>
           </a:p>
@@ -5279,7 +5859,7 @@
           <a:p>
             <a:fld id="{EDB8FCB3-7065-2545-85B8-477E09133F4C}" type="datetimeFigureOut">
               <a:rPr lang="en-US" smtClean="0"/>
-              <a:t>10/30/2018</a:t>
+              <a:t>10/31/2018</a:t>
             </a:fld>
             <a:endParaRPr lang="en-US"/>
           </a:p>
@@ -5558,7 +6138,7 @@
           <a:p>
             <a:fld id="{AA5A275E-2CFF-43A0-9D08-EC684083658F}" type="datetimeFigureOut">
               <a:rPr lang="en-US" smtClean="0"/>
-              <a:t>10/30/2018</a:t>
+              <a:t>10/31/2018</a:t>
             </a:fld>
             <a:endParaRPr lang="en-US"/>
           </a:p>
@@ -5754,7 +6334,7 @@
           <a:p>
             <a:fld id="{EDB8FCB3-7065-2545-85B8-477E09133F4C}" type="datetimeFigureOut">
               <a:rPr lang="en-US" smtClean="0"/>
-              <a:t>10/30/2018</a:t>
+              <a:t>10/31/2018</a:t>
             </a:fld>
             <a:endParaRPr lang="en-US"/>
           </a:p>
@@ -6044,7 +6624,7 @@
           <a:p>
             <a:fld id="{EDB8FCB3-7065-2545-85B8-477E09133F4C}" type="datetimeFigureOut">
               <a:rPr lang="en-US" smtClean="0"/>
-              <a:t>10/30/2018</a:t>
+              <a:t>10/31/2018</a:t>
             </a:fld>
             <a:endParaRPr lang="en-US"/>
           </a:p>
@@ -6332,7 +6912,7 @@
           <a:p>
             <a:fld id="{EDB8FCB3-7065-2545-85B8-477E09133F4C}" type="datetimeFigureOut">
               <a:rPr lang="en-US" smtClean="0"/>
-              <a:t>10/30/2018</a:t>
+              <a:t>10/31/2018</a:t>
             </a:fld>
             <a:endParaRPr lang="en-US"/>
           </a:p>
@@ -6754,7 +7334,7 @@
           <a:p>
             <a:fld id="{EDB8FCB3-7065-2545-85B8-477E09133F4C}" type="datetimeFigureOut">
               <a:rPr lang="en-US" smtClean="0"/>
-              <a:t>10/30/2018</a:t>
+              <a:t>10/31/2018</a:t>
             </a:fld>
             <a:endParaRPr lang="en-US"/>
           </a:p>
@@ -6872,7 +7452,7 @@
           <a:p>
             <a:fld id="{EDB8FCB3-7065-2545-85B8-477E09133F4C}" type="datetimeFigureOut">
               <a:rPr lang="en-US" smtClean="0"/>
-              <a:t>10/30/2018</a:t>
+              <a:t>10/31/2018</a:t>
             </a:fld>
             <a:endParaRPr lang="en-US"/>
           </a:p>
@@ -6967,7 +7547,7 @@
           <a:p>
             <a:fld id="{EDB8FCB3-7065-2545-85B8-477E09133F4C}" type="datetimeFigureOut">
               <a:rPr lang="en-US" smtClean="0"/>
-              <a:t>10/30/2018</a:t>
+              <a:t>10/31/2018</a:t>
             </a:fld>
             <a:endParaRPr lang="en-US"/>
           </a:p>
@@ -7244,7 +7824,7 @@
           <a:p>
             <a:fld id="{EDB8FCB3-7065-2545-85B8-477E09133F4C}" type="datetimeFigureOut">
               <a:rPr lang="en-US" smtClean="0"/>
-              <a:t>10/30/2018</a:t>
+              <a:t>10/31/2018</a:t>
             </a:fld>
             <a:endParaRPr lang="en-US"/>
           </a:p>
@@ -7501,7 +8081,7 @@
           <a:p>
             <a:fld id="{EDB8FCB3-7065-2545-85B8-477E09133F4C}" type="datetimeFigureOut">
               <a:rPr lang="en-US" smtClean="0"/>
-              <a:t>10/30/2018</a:t>
+              <a:t>10/31/2018</a:t>
             </a:fld>
             <a:endParaRPr lang="en-US"/>
           </a:p>
@@ -7671,7 +8251,7 @@
           <a:p>
             <a:fld id="{EDB8FCB3-7065-2545-85B8-477E09133F4C}" type="datetimeFigureOut">
               <a:rPr lang="en-US" smtClean="0"/>
-              <a:t>10/30/2018</a:t>
+              <a:t>10/31/2018</a:t>
             </a:fld>
             <a:endParaRPr lang="en-US"/>
           </a:p>
@@ -7851,7 +8431,7 @@
           <a:p>
             <a:fld id="{EDB8FCB3-7065-2545-85B8-477E09133F4C}" type="datetimeFigureOut">
               <a:rPr lang="en-US" smtClean="0"/>
-              <a:t>10/30/2018</a:t>
+              <a:t>10/31/2018</a:t>
             </a:fld>
             <a:endParaRPr lang="en-US"/>
           </a:p>
@@ -8016,7 +8596,7 @@
           <a:p>
             <a:fld id="{AA5A275E-2CFF-43A0-9D08-EC684083658F}" type="datetimeFigureOut">
               <a:rPr lang="en-US" smtClean="0"/>
-              <a:t>10/30/2018</a:t>
+              <a:t>10/31/2018</a:t>
             </a:fld>
             <a:endParaRPr lang="en-US"/>
           </a:p>
@@ -8284,7 +8864,7 @@
           <a:p>
             <a:fld id="{BA8A82E4-69B0-C94D-842E-F21802E959A1}" type="datetimeFigureOut">
               <a:rPr lang="en-US" smtClean="0"/>
-              <a:t>10/30/2018</a:t>
+              <a:t>10/31/2018</a:t>
             </a:fld>
             <a:endParaRPr lang="en-US"/>
           </a:p>
@@ -8454,7 +9034,7 @@
           <a:p>
             <a:fld id="{BA8A82E4-69B0-C94D-842E-F21802E959A1}" type="datetimeFigureOut">
               <a:rPr lang="en-US" smtClean="0"/>
-              <a:t>10/30/2018</a:t>
+              <a:t>10/31/2018</a:t>
             </a:fld>
             <a:endParaRPr lang="en-US"/>
           </a:p>
@@ -8700,7 +9280,7 @@
           <a:p>
             <a:fld id="{BA8A82E4-69B0-C94D-842E-F21802E959A1}" type="datetimeFigureOut">
               <a:rPr lang="en-US" smtClean="0"/>
-              <a:t>10/30/2018</a:t>
+              <a:t>10/31/2018</a:t>
             </a:fld>
             <a:endParaRPr lang="en-US"/>
           </a:p>
@@ -8988,7 +9568,7 @@
           <a:p>
             <a:fld id="{BA8A82E4-69B0-C94D-842E-F21802E959A1}" type="datetimeFigureOut">
               <a:rPr lang="en-US" smtClean="0"/>
-              <a:t>10/30/2018</a:t>
+              <a:t>10/31/2018</a:t>
             </a:fld>
             <a:endParaRPr lang="en-US"/>
           </a:p>
@@ -9410,7 +9990,7 @@
           <a:p>
             <a:fld id="{BA8A82E4-69B0-C94D-842E-F21802E959A1}" type="datetimeFigureOut">
               <a:rPr lang="en-US" smtClean="0"/>
-              <a:t>10/30/2018</a:t>
+              <a:t>10/31/2018</a:t>
             </a:fld>
             <a:endParaRPr lang="en-US"/>
           </a:p>
@@ -9528,7 +10108,7 @@
           <a:p>
             <a:fld id="{BA8A82E4-69B0-C94D-842E-F21802E959A1}" type="datetimeFigureOut">
               <a:rPr lang="en-US" smtClean="0"/>
-              <a:t>10/30/2018</a:t>
+              <a:t>10/31/2018</a:t>
             </a:fld>
             <a:endParaRPr lang="en-US"/>
           </a:p>
@@ -9623,7 +10203,7 @@
           <a:p>
             <a:fld id="{BA8A82E4-69B0-C94D-842E-F21802E959A1}" type="datetimeFigureOut">
               <a:rPr lang="en-US" smtClean="0"/>
-              <a:t>10/30/2018</a:t>
+              <a:t>10/31/2018</a:t>
             </a:fld>
             <a:endParaRPr lang="en-US"/>
           </a:p>
@@ -9900,7 +10480,7 @@
           <a:p>
             <a:fld id="{BA8A82E4-69B0-C94D-842E-F21802E959A1}" type="datetimeFigureOut">
               <a:rPr lang="en-US" smtClean="0"/>
-              <a:t>10/30/2018</a:t>
+              <a:t>10/31/2018</a:t>
             </a:fld>
             <a:endParaRPr lang="en-US"/>
           </a:p>
@@ -10157,7 +10737,7 @@
           <a:p>
             <a:fld id="{BA8A82E4-69B0-C94D-842E-F21802E959A1}" type="datetimeFigureOut">
               <a:rPr lang="en-US" smtClean="0"/>
-              <a:t>10/30/2018</a:t>
+              <a:t>10/31/2018</a:t>
             </a:fld>
             <a:endParaRPr lang="en-US"/>
           </a:p>
@@ -10327,7 +10907,7 @@
           <a:p>
             <a:fld id="{BA8A82E4-69B0-C94D-842E-F21802E959A1}" type="datetimeFigureOut">
               <a:rPr lang="en-US" smtClean="0"/>
-              <a:t>10/30/2018</a:t>
+              <a:t>10/31/2018</a:t>
             </a:fld>
             <a:endParaRPr lang="en-US"/>
           </a:p>
@@ -10569,7 +11149,7 @@
           <a:p>
             <a:fld id="{656615A7-4A63-FF4E-BF08-5885279056B7}" type="datetimeFigureOut">
               <a:rPr lang="en-US" smtClean="0"/>
-              <a:t>10/30/2018</a:t>
+              <a:t>10/31/2018</a:t>
             </a:fld>
             <a:endParaRPr lang="en-US"/>
           </a:p>
@@ -10803,7 +11383,7 @@
           <a:p>
             <a:fld id="{BA8A82E4-69B0-C94D-842E-F21802E959A1}" type="datetimeFigureOut">
               <a:rPr lang="en-US" smtClean="0"/>
-              <a:t>10/30/2018</a:t>
+              <a:t>10/31/2018</a:t>
             </a:fld>
             <a:endParaRPr lang="en-US"/>
           </a:p>
@@ -10973,7 +11553,7 @@
           <a:p>
             <a:fld id="{656615A7-4A63-FF4E-BF08-5885279056B7}" type="datetimeFigureOut">
               <a:rPr lang="en-US" smtClean="0"/>
-              <a:t>10/30/2018</a:t>
+              <a:t>10/31/2018</a:t>
             </a:fld>
             <a:endParaRPr lang="en-US"/>
           </a:p>
@@ -11219,7 +11799,7 @@
           <a:p>
             <a:fld id="{656615A7-4A63-FF4E-BF08-5885279056B7}" type="datetimeFigureOut">
               <a:rPr lang="en-US" smtClean="0"/>
-              <a:t>10/30/2018</a:t>
+              <a:t>10/31/2018</a:t>
             </a:fld>
             <a:endParaRPr lang="en-US"/>
           </a:p>
@@ -11561,7 +12141,7 @@
           <a:p>
             <a:fld id="{656615A7-4A63-FF4E-BF08-5885279056B7}" type="datetimeFigureOut">
               <a:rPr lang="en-US" smtClean="0"/>
-              <a:t>10/30/2018</a:t>
+              <a:t>10/31/2018</a:t>
             </a:fld>
             <a:endParaRPr lang="en-US"/>
           </a:p>
@@ -11983,7 +12563,7 @@
           <a:p>
             <a:fld id="{656615A7-4A63-FF4E-BF08-5885279056B7}" type="datetimeFigureOut">
               <a:rPr lang="en-US" smtClean="0"/>
-              <a:t>10/30/2018</a:t>
+              <a:t>10/31/2018</a:t>
             </a:fld>
             <a:endParaRPr lang="en-US"/>
           </a:p>
@@ -12101,7 +12681,7 @@
           <a:p>
             <a:fld id="{656615A7-4A63-FF4E-BF08-5885279056B7}" type="datetimeFigureOut">
               <a:rPr lang="en-US" smtClean="0"/>
-              <a:t>10/30/2018</a:t>
+              <a:t>10/31/2018</a:t>
             </a:fld>
             <a:endParaRPr lang="en-US"/>
           </a:p>
@@ -12261,7 +12841,7 @@
           <a:p>
             <a:fld id="{AA5A275E-2CFF-43A0-9D08-EC684083658F}" type="datetimeFigureOut">
               <a:rPr lang="en-US" smtClean="0"/>
-              <a:t>10/30/2018</a:t>
+              <a:t>10/31/2018</a:t>
             </a:fld>
             <a:endParaRPr lang="en-US"/>
           </a:p>
@@ -12379,7 +12959,7 @@
           <a:p>
             <a:fld id="{656615A7-4A63-FF4E-BF08-5885279056B7}" type="datetimeFigureOut">
               <a:rPr lang="en-US" smtClean="0"/>
-              <a:t>10/30/2018</a:t>
+              <a:t>10/31/2018</a:t>
             </a:fld>
             <a:endParaRPr lang="en-US"/>
           </a:p>
@@ -12689,7 +13269,7 @@
           <a:p>
             <a:fld id="{656615A7-4A63-FF4E-BF08-5885279056B7}" type="datetimeFigureOut">
               <a:rPr lang="en-US" smtClean="0"/>
-              <a:t>10/30/2018</a:t>
+              <a:t>10/31/2018</a:t>
             </a:fld>
             <a:endParaRPr lang="en-US"/>
           </a:p>
@@ -12946,7 +13526,7 @@
           <a:p>
             <a:fld id="{656615A7-4A63-FF4E-BF08-5885279056B7}" type="datetimeFigureOut">
               <a:rPr lang="en-US" smtClean="0"/>
-              <a:t>10/30/2018</a:t>
+              <a:t>10/31/2018</a:t>
             </a:fld>
             <a:endParaRPr lang="en-US"/>
           </a:p>
@@ -13116,7 +13696,7 @@
           <a:p>
             <a:fld id="{656615A7-4A63-FF4E-BF08-5885279056B7}" type="datetimeFigureOut">
               <a:rPr lang="en-US" smtClean="0"/>
-              <a:t>10/30/2018</a:t>
+              <a:t>10/31/2018</a:t>
             </a:fld>
             <a:endParaRPr lang="en-US"/>
           </a:p>
@@ -13296,7 +13876,7 @@
           <a:p>
             <a:fld id="{656615A7-4A63-FF4E-BF08-5885279056B7}" type="datetimeFigureOut">
               <a:rPr lang="en-US" smtClean="0"/>
-              <a:t>10/30/2018</a:t>
+              <a:t>10/31/2018</a:t>
             </a:fld>
             <a:endParaRPr lang="en-US"/>
           </a:p>
@@ -14894,7 +15474,7 @@
           <a:p>
             <a:fld id="{AA5A275E-2CFF-43A0-9D08-EC684083658F}" type="datetimeFigureOut">
               <a:rPr lang="en-US" smtClean="0"/>
-              <a:t>10/30/2018</a:t>
+              <a:t>10/31/2018</a:t>
             </a:fld>
             <a:endParaRPr lang="en-US"/>
           </a:p>
@@ -16922,7 +17502,7 @@
           <a:p>
             <a:fld id="{504C849D-9CF7-3F4F-9AF7-49C86D8F7A74}" type="datetimeFigureOut">
               <a:rPr lang="en-US" smtClean="0"/>
-              <a:t>10/30/2018</a:t>
+              <a:t>10/31/2018</a:t>
             </a:fld>
             <a:endParaRPr lang="en-US"/>
           </a:p>
@@ -17077,7 +17657,7 @@
           <a:p>
             <a:fld id="{504C849D-9CF7-3F4F-9AF7-49C86D8F7A74}" type="datetimeFigureOut">
               <a:rPr lang="en-US" smtClean="0"/>
-              <a:t>10/30/2018</a:t>
+              <a:t>10/31/2018</a:t>
             </a:fld>
             <a:endParaRPr lang="en-US"/>
           </a:p>
@@ -17363,7 +17943,7 @@
           <a:p>
             <a:fld id="{AA5A275E-2CFF-43A0-9D08-EC684083658F}" type="datetimeFigureOut">
               <a:rPr lang="en-US" smtClean="0"/>
-              <a:t>10/30/2018</a:t>
+              <a:t>10/31/2018</a:t>
             </a:fld>
             <a:endParaRPr lang="en-US"/>
           </a:p>
@@ -17643,7 +18223,7 @@
           <a:p>
             <a:fld id="{504C849D-9CF7-3F4F-9AF7-49C86D8F7A74}" type="datetimeFigureOut">
               <a:rPr lang="en-US" smtClean="0"/>
-              <a:t>10/30/2018</a:t>
+              <a:t>10/31/2018</a:t>
             </a:fld>
             <a:endParaRPr lang="en-US"/>
           </a:p>
@@ -17916,7 +18496,7 @@
           <a:p>
             <a:fld id="{504C849D-9CF7-3F4F-9AF7-49C86D8F7A74}" type="datetimeFigureOut">
               <a:rPr lang="en-US" smtClean="0"/>
-              <a:t>10/30/2018</a:t>
+              <a:t>10/31/2018</a:t>
             </a:fld>
             <a:endParaRPr lang="en-US"/>
           </a:p>
@@ -18323,7 +18903,7 @@
           <a:p>
             <a:fld id="{504C849D-9CF7-3F4F-9AF7-49C86D8F7A74}" type="datetimeFigureOut">
               <a:rPr lang="en-US" smtClean="0"/>
-              <a:t>10/30/2018</a:t>
+              <a:t>10/31/2018</a:t>
             </a:fld>
             <a:endParaRPr lang="en-US"/>
           </a:p>
@@ -18426,7 +19006,7 @@
           <a:p>
             <a:fld id="{504C849D-9CF7-3F4F-9AF7-49C86D8F7A74}" type="datetimeFigureOut">
               <a:rPr lang="en-US" smtClean="0"/>
-              <a:t>10/30/2018</a:t>
+              <a:t>10/31/2018</a:t>
             </a:fld>
             <a:endParaRPr lang="en-US"/>
           </a:p>
@@ -18537,7 +19117,7 @@
           <a:p>
             <a:fld id="{504C849D-9CF7-3F4F-9AF7-49C86D8F7A74}" type="datetimeFigureOut">
               <a:rPr lang="en-US" smtClean="0"/>
-              <a:t>10/30/2018</a:t>
+              <a:t>10/31/2018</a:t>
             </a:fld>
             <a:endParaRPr lang="en-US"/>
           </a:p>
@@ -18799,7 +19379,7 @@
           <a:p>
             <a:fld id="{504C849D-9CF7-3F4F-9AF7-49C86D8F7A74}" type="datetimeFigureOut">
               <a:rPr lang="en-US" smtClean="0"/>
-              <a:t>10/30/2018</a:t>
+              <a:t>10/31/2018</a:t>
             </a:fld>
             <a:endParaRPr lang="en-US"/>
           </a:p>
@@ -19041,7 +19621,7 @@
           <a:p>
             <a:fld id="{504C849D-9CF7-3F4F-9AF7-49C86D8F7A74}" type="datetimeFigureOut">
               <a:rPr lang="en-US" smtClean="0"/>
-              <a:t>10/30/2018</a:t>
+              <a:t>10/31/2018</a:t>
             </a:fld>
             <a:endParaRPr lang="en-US"/>
           </a:p>
@@ -19196,7 +19776,7 @@
           <a:p>
             <a:fld id="{504C849D-9CF7-3F4F-9AF7-49C86D8F7A74}" type="datetimeFigureOut">
               <a:rPr lang="en-US" smtClean="0"/>
-              <a:t>10/30/2018</a:t>
+              <a:t>10/31/2018</a:t>
             </a:fld>
             <a:endParaRPr lang="en-US"/>
           </a:p>
@@ -19361,7 +19941,7 @@
           <a:p>
             <a:fld id="{504C849D-9CF7-3F4F-9AF7-49C86D8F7A74}" type="datetimeFigureOut">
               <a:rPr lang="en-US" smtClean="0"/>
-              <a:t>10/30/2018</a:t>
+              <a:t>10/31/2018</a:t>
             </a:fld>
             <a:endParaRPr lang="en-US"/>
           </a:p>
@@ -19580,7 +20160,7 @@
           <a:p>
             <a:fld id="{EDB8FCB3-7065-2545-85B8-477E09133F4C}" type="datetimeFigureOut">
               <a:rPr lang="en-US" smtClean="0"/>
-              <a:t>10/30/2018</a:t>
+              <a:t>10/31/2018</a:t>
             </a:fld>
             <a:endParaRPr lang="en-US"/>
           </a:p>
@@ -20023,7 +20603,7 @@
           <a:p>
             <a:fld id="{AA5A275E-2CFF-43A0-9D08-EC684083658F}" type="datetimeFigureOut">
               <a:rPr lang="en-US" smtClean="0"/>
-              <a:t>10/30/2018</a:t>
+              <a:t>10/31/2018</a:t>
             </a:fld>
             <a:endParaRPr lang="en-US"/>
           </a:p>
@@ -20219,7 +20799,7 @@
           <a:p>
             <a:fld id="{EDB8FCB3-7065-2545-85B8-477E09133F4C}" type="datetimeFigureOut">
               <a:rPr lang="en-US" smtClean="0"/>
-              <a:t>10/30/2018</a:t>
+              <a:t>10/31/2018</a:t>
             </a:fld>
             <a:endParaRPr lang="en-US"/>
           </a:p>
@@ -20509,7 +21089,7 @@
           <a:p>
             <a:fld id="{EDB8FCB3-7065-2545-85B8-477E09133F4C}" type="datetimeFigureOut">
               <a:rPr lang="en-US" smtClean="0"/>
-              <a:t>10/30/2018</a:t>
+              <a:t>10/31/2018</a:t>
             </a:fld>
             <a:endParaRPr lang="en-US"/>
           </a:p>
@@ -20797,7 +21377,7 @@
           <a:p>
             <a:fld id="{EDB8FCB3-7065-2545-85B8-477E09133F4C}" type="datetimeFigureOut">
               <a:rPr lang="en-US" smtClean="0"/>
-              <a:t>10/30/2018</a:t>
+              <a:t>10/31/2018</a:t>
             </a:fld>
             <a:endParaRPr lang="en-US"/>
           </a:p>
@@ -21219,7 +21799,7 @@
           <a:p>
             <a:fld id="{EDB8FCB3-7065-2545-85B8-477E09133F4C}" type="datetimeFigureOut">
               <a:rPr lang="en-US" smtClean="0"/>
-              <a:t>10/30/2018</a:t>
+              <a:t>10/31/2018</a:t>
             </a:fld>
             <a:endParaRPr lang="en-US"/>
           </a:p>
@@ -21337,7 +21917,7 @@
           <a:p>
             <a:fld id="{EDB8FCB3-7065-2545-85B8-477E09133F4C}" type="datetimeFigureOut">
               <a:rPr lang="en-US" smtClean="0"/>
-              <a:t>10/30/2018</a:t>
+              <a:t>10/31/2018</a:t>
             </a:fld>
             <a:endParaRPr lang="en-US"/>
           </a:p>
@@ -21432,7 +22012,7 @@
           <a:p>
             <a:fld id="{EDB8FCB3-7065-2545-85B8-477E09133F4C}" type="datetimeFigureOut">
               <a:rPr lang="en-US" smtClean="0"/>
-              <a:t>10/30/2018</a:t>
+              <a:t>10/31/2018</a:t>
             </a:fld>
             <a:endParaRPr lang="en-US"/>
           </a:p>
@@ -21709,7 +22289,7 @@
           <a:p>
             <a:fld id="{EDB8FCB3-7065-2545-85B8-477E09133F4C}" type="datetimeFigureOut">
               <a:rPr lang="en-US" smtClean="0"/>
-              <a:t>10/30/2018</a:t>
+              <a:t>10/31/2018</a:t>
             </a:fld>
             <a:endParaRPr lang="en-US"/>
           </a:p>
@@ -21966,7 +22546,7 @@
           <a:p>
             <a:fld id="{EDB8FCB3-7065-2545-85B8-477E09133F4C}" type="datetimeFigureOut">
               <a:rPr lang="en-US" smtClean="0"/>
-              <a:t>10/30/2018</a:t>
+              <a:t>10/31/2018</a:t>
             </a:fld>
             <a:endParaRPr lang="en-US"/>
           </a:p>
@@ -22136,7 +22716,7 @@
           <a:p>
             <a:fld id="{EDB8FCB3-7065-2545-85B8-477E09133F4C}" type="datetimeFigureOut">
               <a:rPr lang="en-US" smtClean="0"/>
-              <a:t>10/30/2018</a:t>
+              <a:t>10/31/2018</a:t>
             </a:fld>
             <a:endParaRPr lang="en-US"/>
           </a:p>
@@ -22316,7 +22896,7 @@
           <a:p>
             <a:fld id="{EDB8FCB3-7065-2545-85B8-477E09133F4C}" type="datetimeFigureOut">
               <a:rPr lang="en-US" smtClean="0"/>
-              <a:t>10/30/2018</a:t>
+              <a:t>10/31/2018</a:t>
             </a:fld>
             <a:endParaRPr lang="en-US"/>
           </a:p>
@@ -22424,7 +23004,7 @@
           <a:p>
             <a:fld id="{AA5A275E-2CFF-43A0-9D08-EC684083658F}" type="datetimeFigureOut">
               <a:rPr lang="en-US" smtClean="0"/>
-              <a:t>10/30/2018</a:t>
+              <a:t>10/31/2018</a:t>
             </a:fld>
             <a:endParaRPr lang="en-US"/>
           </a:p>
@@ -22692,7 +23272,7 @@
           <a:p>
             <a:fld id="{BA8A82E4-69B0-C94D-842E-F21802E959A1}" type="datetimeFigureOut">
               <a:rPr lang="en-US" smtClean="0"/>
-              <a:t>10/30/2018</a:t>
+              <a:t>10/31/2018</a:t>
             </a:fld>
             <a:endParaRPr lang="en-US"/>
           </a:p>
@@ -22862,7 +23442,7 @@
           <a:p>
             <a:fld id="{BA8A82E4-69B0-C94D-842E-F21802E959A1}" type="datetimeFigureOut">
               <a:rPr lang="en-US" smtClean="0"/>
-              <a:t>10/30/2018</a:t>
+              <a:t>10/31/2018</a:t>
             </a:fld>
             <a:endParaRPr lang="en-US"/>
           </a:p>
@@ -23108,7 +23688,7 @@
           <a:p>
             <a:fld id="{BA8A82E4-69B0-C94D-842E-F21802E959A1}" type="datetimeFigureOut">
               <a:rPr lang="en-US" smtClean="0"/>
-              <a:t>10/30/2018</a:t>
+              <a:t>10/31/2018</a:t>
             </a:fld>
             <a:endParaRPr lang="en-US"/>
           </a:p>
@@ -23396,7 +23976,7 @@
           <a:p>
             <a:fld id="{BA8A82E4-69B0-C94D-842E-F21802E959A1}" type="datetimeFigureOut">
               <a:rPr lang="en-US" smtClean="0"/>
-              <a:t>10/30/2018</a:t>
+              <a:t>10/31/2018</a:t>
             </a:fld>
             <a:endParaRPr lang="en-US"/>
           </a:p>
@@ -23818,7 +24398,7 @@
           <a:p>
             <a:fld id="{BA8A82E4-69B0-C94D-842E-F21802E959A1}" type="datetimeFigureOut">
               <a:rPr lang="en-US" smtClean="0"/>
-              <a:t>10/30/2018</a:t>
+              <a:t>10/31/2018</a:t>
             </a:fld>
             <a:endParaRPr lang="en-US"/>
           </a:p>
@@ -23936,7 +24516,7 @@
           <a:p>
             <a:fld id="{BA8A82E4-69B0-C94D-842E-F21802E959A1}" type="datetimeFigureOut">
               <a:rPr lang="en-US" smtClean="0"/>
-              <a:t>10/30/2018</a:t>
+              <a:t>10/31/2018</a:t>
             </a:fld>
             <a:endParaRPr lang="en-US"/>
           </a:p>
@@ -24031,7 +24611,7 @@
           <a:p>
             <a:fld id="{BA8A82E4-69B0-C94D-842E-F21802E959A1}" type="datetimeFigureOut">
               <a:rPr lang="en-US" smtClean="0"/>
-              <a:t>10/30/2018</a:t>
+              <a:t>10/31/2018</a:t>
             </a:fld>
             <a:endParaRPr lang="en-US"/>
           </a:p>
@@ -24308,7 +24888,7 @@
           <a:p>
             <a:fld id="{BA8A82E4-69B0-C94D-842E-F21802E959A1}" type="datetimeFigureOut">
               <a:rPr lang="en-US" smtClean="0"/>
-              <a:t>10/30/2018</a:t>
+              <a:t>10/31/2018</a:t>
             </a:fld>
             <a:endParaRPr lang="en-US"/>
           </a:p>
@@ -24565,7 +25145,7 @@
           <a:p>
             <a:fld id="{BA8A82E4-69B0-C94D-842E-F21802E959A1}" type="datetimeFigureOut">
               <a:rPr lang="en-US" smtClean="0"/>
-              <a:t>10/30/2018</a:t>
+              <a:t>10/31/2018</a:t>
             </a:fld>
             <a:endParaRPr lang="en-US"/>
           </a:p>
@@ -24735,7 +25315,7 @@
           <a:p>
             <a:fld id="{BA8A82E4-69B0-C94D-842E-F21802E959A1}" type="datetimeFigureOut">
               <a:rPr lang="en-US" smtClean="0"/>
-              <a:t>10/30/2018</a:t>
+              <a:t>10/31/2018</a:t>
             </a:fld>
             <a:endParaRPr lang="en-US"/>
           </a:p>
@@ -24843,7 +25423,7 @@
           <a:p>
             <a:fld id="{AA5A275E-2CFF-43A0-9D08-EC684083658F}" type="datetimeFigureOut">
               <a:rPr lang="en-US" smtClean="0"/>
-              <a:t>10/30/2018</a:t>
+              <a:t>10/31/2018</a:t>
             </a:fld>
             <a:endParaRPr lang="en-US"/>
           </a:p>
@@ -25049,7 +25629,7 @@
           <a:p>
             <a:fld id="{BA8A82E4-69B0-C94D-842E-F21802E959A1}" type="datetimeFigureOut">
               <a:rPr lang="en-US" smtClean="0"/>
-              <a:t>10/30/2018</a:t>
+              <a:t>10/31/2018</a:t>
             </a:fld>
             <a:endParaRPr lang="en-US"/>
           </a:p>
@@ -25253,7 +25833,7 @@
           <a:p>
             <a:fld id="{504C849D-9CF7-3F4F-9AF7-49C86D8F7A74}" type="datetimeFigureOut">
               <a:rPr lang="en-US" smtClean="0"/>
-              <a:t>10/30/2018</a:t>
+              <a:t>10/31/2018</a:t>
             </a:fld>
             <a:endParaRPr lang="en-US"/>
           </a:p>
@@ -25602,7 +26182,7 @@
           <a:p>
             <a:fld id="{504C849D-9CF7-3F4F-9AF7-49C86D8F7A74}" type="datetimeFigureOut">
               <a:rPr lang="en-US" smtClean="0"/>
-              <a:t>10/30/2018</a:t>
+              <a:t>10/31/2018</a:t>
             </a:fld>
             <a:endParaRPr lang="en-US"/>
           </a:p>
@@ -25833,7 +26413,7 @@
           <a:p>
             <a:fld id="{504C849D-9CF7-3F4F-9AF7-49C86D8F7A74}" type="datetimeFigureOut">
               <a:rPr lang="en-US" smtClean="0"/>
-              <a:t>10/30/2018</a:t>
+              <a:t>10/31/2018</a:t>
             </a:fld>
             <a:endParaRPr lang="en-US"/>
           </a:p>
@@ -26137,7 +26717,7 @@
           <a:p>
             <a:fld id="{AA5A275E-2CFF-43A0-9D08-EC684083658F}" type="datetimeFigureOut">
               <a:rPr lang="en-US" smtClean="0"/>
-              <a:t>10/30/2018</a:t>
+              <a:t>10/31/2018</a:t>
             </a:fld>
             <a:endParaRPr lang="en-US"/>
           </a:p>
@@ -26606,7 +27186,7 @@
           <a:p>
             <a:fld id="{504C849D-9CF7-3F4F-9AF7-49C86D8F7A74}" type="datetimeFigureOut">
               <a:rPr lang="en-US" smtClean="0"/>
-              <a:t>10/30/2018</a:t>
+              <a:t>10/31/2018</a:t>
             </a:fld>
             <a:endParaRPr lang="en-US"/>
           </a:p>
@@ -26740,7 +27320,7 @@
           <a:p>
             <a:fld id="{AA5A275E-2CFF-43A0-9D08-EC684083658F}" type="datetimeFigureOut">
               <a:rPr lang="en-US" smtClean="0"/>
-              <a:t>10/30/2018</a:t>
+              <a:t>10/31/2018</a:t>
             </a:fld>
             <a:endParaRPr lang="en-US"/>
           </a:p>
@@ -26874,7 +27454,7 @@
           <a:p>
             <a:fld id="{504C849D-9CF7-3F4F-9AF7-49C86D8F7A74}" type="datetimeFigureOut">
               <a:rPr lang="en-US" smtClean="0"/>
-              <a:t>10/30/2018</a:t>
+              <a:t>10/31/2018</a:t>
             </a:fld>
             <a:endParaRPr lang="en-US"/>
           </a:p>
@@ -27193,7 +27773,7 @@
           <a:p>
             <a:fld id="{504C849D-9CF7-3F4F-9AF7-49C86D8F7A74}" type="datetimeFigureOut">
               <a:rPr lang="en-US" smtClean="0"/>
-              <a:t>10/30/2018</a:t>
+              <a:t>10/31/2018</a:t>
             </a:fld>
             <a:endParaRPr lang="en-US"/>
           </a:p>
@@ -27493,7 +28073,7 @@
           <a:p>
             <a:fld id="{504C849D-9CF7-3F4F-9AF7-49C86D8F7A74}" type="datetimeFigureOut">
               <a:rPr lang="en-US" smtClean="0"/>
-              <a:t>10/30/2018</a:t>
+              <a:t>10/31/2018</a:t>
             </a:fld>
             <a:endParaRPr lang="en-US"/>
           </a:p>
@@ -27812,7 +28392,7 @@
           <a:p>
             <a:fld id="{AA5A275E-2CFF-43A0-9D08-EC684083658F}" type="datetimeFigureOut">
               <a:rPr lang="en-US" smtClean="0"/>
-              <a:t>10/30/2018</a:t>
+              <a:t>10/31/2018</a:t>
             </a:fld>
             <a:endParaRPr lang="en-US"/>
           </a:p>
@@ -28029,7 +28609,7 @@
           <a:p>
             <a:fld id="{504C849D-9CF7-3F4F-9AF7-49C86D8F7A74}" type="datetimeFigureOut">
               <a:rPr lang="en-US" smtClean="0"/>
-              <a:t>10/30/2018</a:t>
+              <a:t>10/31/2018</a:t>
             </a:fld>
             <a:endParaRPr lang="en-US"/>
           </a:p>
@@ -28251,7 +28831,7 @@
           <a:p>
             <a:fld id="{504C849D-9CF7-3F4F-9AF7-49C86D8F7A74}" type="datetimeFigureOut">
               <a:rPr lang="en-US" smtClean="0"/>
-              <a:t>10/30/2018</a:t>
+              <a:t>10/31/2018</a:t>
             </a:fld>
             <a:endParaRPr lang="en-US"/>
           </a:p>
@@ -28556,7 +29136,7 @@
           <a:p>
             <a:fld id="{AA5A275E-2CFF-43A0-9D08-EC684083658F}" type="datetimeFigureOut">
               <a:rPr lang="en-US" smtClean="0"/>
-              <a:t>10/30/2018</a:t>
+              <a:t>10/31/2018</a:t>
             </a:fld>
             <a:endParaRPr lang="en-US"/>
           </a:p>
@@ -28747,7 +29327,7 @@
           <a:p>
             <a:fld id="{AA5A275E-2CFF-43A0-9D08-EC684083658F}" type="datetimeFigureOut">
               <a:rPr lang="en-US" smtClean="0"/>
-              <a:t>10/30/2018</a:t>
+              <a:t>10/31/2018</a:t>
             </a:fld>
             <a:endParaRPr lang="en-US"/>
           </a:p>
@@ -29015,7 +29595,7 @@
           <a:p>
             <a:fld id="{656615A7-4A63-FF4E-BF08-5885279056B7}" type="datetimeFigureOut">
               <a:rPr lang="en-US" smtClean="0"/>
-              <a:t>10/30/2018</a:t>
+              <a:t>10/31/2018</a:t>
             </a:fld>
             <a:endParaRPr lang="en-US"/>
           </a:p>
@@ -29239,7 +29819,7 @@
           <a:p>
             <a:fld id="{656615A7-4A63-FF4E-BF08-5885279056B7}" type="datetimeFigureOut">
               <a:rPr lang="en-US" smtClean="0"/>
-              <a:t>10/30/2018</a:t>
+              <a:t>10/31/2018</a:t>
             </a:fld>
             <a:endParaRPr lang="en-US"/>
           </a:p>
@@ -29485,7 +30065,7 @@
           <a:p>
             <a:fld id="{656615A7-4A63-FF4E-BF08-5885279056B7}" type="datetimeFigureOut">
               <a:rPr lang="en-US" smtClean="0"/>
-              <a:t>10/30/2018</a:t>
+              <a:t>10/31/2018</a:t>
             </a:fld>
             <a:endParaRPr lang="en-US"/>
           </a:p>
@@ -29827,7 +30407,7 @@
           <a:p>
             <a:fld id="{656615A7-4A63-FF4E-BF08-5885279056B7}" type="datetimeFigureOut">
               <a:rPr lang="en-US" smtClean="0"/>
-              <a:t>10/30/2018</a:t>
+              <a:t>10/31/2018</a:t>
             </a:fld>
             <a:endParaRPr lang="en-US"/>
           </a:p>
@@ -30249,7 +30829,7 @@
           <a:p>
             <a:fld id="{656615A7-4A63-FF4E-BF08-5885279056B7}" type="datetimeFigureOut">
               <a:rPr lang="en-US" smtClean="0"/>
-              <a:t>10/30/2018</a:t>
+              <a:t>10/31/2018</a:t>
             </a:fld>
             <a:endParaRPr lang="en-US"/>
           </a:p>
@@ -30367,7 +30947,7 @@
           <a:p>
             <a:fld id="{656615A7-4A63-FF4E-BF08-5885279056B7}" type="datetimeFigureOut">
               <a:rPr lang="en-US" smtClean="0"/>
-              <a:t>10/30/2018</a:t>
+              <a:t>10/31/2018</a:t>
             </a:fld>
             <a:endParaRPr lang="en-US"/>
           </a:p>
@@ -30641,7 +31221,7 @@
           <a:p>
             <a:fld id="{AA5A275E-2CFF-43A0-9D08-EC684083658F}" type="datetimeFigureOut">
               <a:rPr lang="en-US" smtClean="0"/>
-              <a:t>10/30/2018</a:t>
+              <a:t>10/31/2018</a:t>
             </a:fld>
             <a:endParaRPr lang="en-US"/>
           </a:p>
@@ -30762,7 +31342,7 @@
           <a:p>
             <a:fld id="{656615A7-4A63-FF4E-BF08-5885279056B7}" type="datetimeFigureOut">
               <a:rPr lang="en-US" smtClean="0"/>
-              <a:t>10/30/2018</a:t>
+              <a:t>10/31/2018</a:t>
             </a:fld>
             <a:endParaRPr lang="en-US"/>
           </a:p>
@@ -31072,7 +31652,7 @@
           <a:p>
             <a:fld id="{656615A7-4A63-FF4E-BF08-5885279056B7}" type="datetimeFigureOut">
               <a:rPr lang="en-US" smtClean="0"/>
-              <a:t>10/30/2018</a:t>
+              <a:t>10/31/2018</a:t>
             </a:fld>
             <a:endParaRPr lang="en-US"/>
           </a:p>
@@ -31329,7 +31909,7 @@
           <a:p>
             <a:fld id="{656615A7-4A63-FF4E-BF08-5885279056B7}" type="datetimeFigureOut">
               <a:rPr lang="en-US" smtClean="0"/>
-              <a:t>10/30/2018</a:t>
+              <a:t>10/31/2018</a:t>
             </a:fld>
             <a:endParaRPr lang="en-US"/>
           </a:p>
@@ -31499,7 +32079,7 @@
           <a:p>
             <a:fld id="{656615A7-4A63-FF4E-BF08-5885279056B7}" type="datetimeFigureOut">
               <a:rPr lang="en-US" smtClean="0"/>
-              <a:t>10/30/2018</a:t>
+              <a:t>10/31/2018</a:t>
             </a:fld>
             <a:endParaRPr lang="en-US"/>
           </a:p>
@@ -31679,7 +32259,7 @@
           <a:p>
             <a:fld id="{656615A7-4A63-FF4E-BF08-5885279056B7}" type="datetimeFigureOut">
               <a:rPr lang="en-US" smtClean="0"/>
-              <a:t>10/30/2018</a:t>
+              <a:t>10/31/2018</a:t>
             </a:fld>
             <a:endParaRPr lang="en-US"/>
           </a:p>
@@ -34422,7 +35002,7 @@
           <a:p>
             <a:fld id="{EDB8FCB3-7065-2545-85B8-477E09133F4C}" type="datetimeFigureOut">
               <a:rPr lang="en-US" smtClean="0"/>
-              <a:t>10/30/2018</a:t>
+              <a:t>10/31/2018</a:t>
             </a:fld>
             <a:endParaRPr lang="en-US"/>
           </a:p>
@@ -35111,7 +35691,7 @@
           <a:p>
             <a:fld id="{BA8A82E4-69B0-C94D-842E-F21802E959A1}" type="datetimeFigureOut">
               <a:rPr lang="en-US" smtClean="0"/>
-              <a:t>10/30/2018</a:t>
+              <a:t>10/31/2018</a:t>
             </a:fld>
             <a:endParaRPr lang="en-US"/>
           </a:p>
@@ -35697,7 +36277,7 @@
           <a:p>
             <a:fld id="{656615A7-4A63-FF4E-BF08-5885279056B7}" type="datetimeFigureOut">
               <a:rPr lang="en-US" smtClean="0"/>
-              <a:t>10/30/2018</a:t>
+              <a:t>10/31/2018</a:t>
             </a:fld>
             <a:endParaRPr lang="en-US"/>
           </a:p>
@@ -37736,7 +38316,7 @@
           <a:p>
             <a:fld id="{EDB8FCB3-7065-2545-85B8-477E09133F4C}" type="datetimeFigureOut">
               <a:rPr lang="en-US" smtClean="0"/>
-              <a:t>10/30/2018</a:t>
+              <a:t>10/31/2018</a:t>
             </a:fld>
             <a:endParaRPr lang="en-US"/>
           </a:p>
@@ -38425,7 +39005,7 @@
           <a:p>
             <a:fld id="{BA8A82E4-69B0-C94D-842E-F21802E959A1}" type="datetimeFigureOut">
               <a:rPr lang="en-US" smtClean="0"/>
-              <a:t>10/30/2018</a:t>
+              <a:t>10/31/2018</a:t>
             </a:fld>
             <a:endParaRPr lang="en-US"/>
           </a:p>
@@ -39646,7 +40226,7 @@
           <a:p>
             <a:fld id="{656615A7-4A63-FF4E-BF08-5885279056B7}" type="datetimeFigureOut">
               <a:rPr lang="en-US" smtClean="0"/>
-              <a:t>10/30/2018</a:t>
+              <a:t>10/31/2018</a:t>
             </a:fld>
             <a:endParaRPr lang="en-US"/>
           </a:p>
@@ -41086,8 +41666,8 @@
         </p:nvSpPr>
         <p:spPr>
           <a:xfrm>
-            <a:off x="691236" y="1904227"/>
-            <a:ext cx="10363200" cy="1465992"/>
+            <a:off x="691236" y="2117123"/>
+            <a:ext cx="10363200" cy="1146003"/>
           </a:xfrm>
         </p:spPr>
         <p:txBody>
@@ -41325,7 +41905,7 @@
         </p:nvSpPr>
         <p:spPr bwMode="auto">
           <a:xfrm>
-            <a:off x="777733" y="4577063"/>
+            <a:off x="777733" y="4675917"/>
             <a:ext cx="10363200" cy="801559"/>
           </a:xfrm>
           <a:prstGeom prst="rect">
@@ -41541,6 +42121,927 @@
   <p:clrMapOvr>
     <a:masterClrMapping/>
   </p:clrMapOvr>
+  <p:timing>
+    <p:tnLst>
+      <p:par>
+        <p:cTn id="1" dur="indefinite" restart="never" nodeType="tmRoot"/>
+      </p:par>
+    </p:tnLst>
+  </p:timing>
+</p:sld>
+</file>
+
+<file path=ppt/slides/slide10.xml><?xml version="1.0" encoding="utf-8"?>
+<p:sld xmlns:a="http://schemas.openxmlformats.org/drawingml/2006/main" xmlns:r="http://schemas.openxmlformats.org/officeDocument/2006/relationships" xmlns:p="http://schemas.openxmlformats.org/presentationml/2006/main">
+  <p:cSld>
+    <p:spTree>
+      <p:nvGrpSpPr>
+        <p:cNvPr id="1" name=""/>
+        <p:cNvGrpSpPr/>
+        <p:nvPr/>
+      </p:nvGrpSpPr>
+      <p:grpSpPr>
+        <a:xfrm>
+          <a:off x="0" y="0"/>
+          <a:ext cx="0" cy="0"/>
+          <a:chOff x="0" y="0"/>
+          <a:chExt cx="0" cy="0"/>
+        </a:xfrm>
+      </p:grpSpPr>
+      <p:sp>
+        <p:nvSpPr>
+          <p:cNvPr id="2" name="Content Placeholder 1"/>
+          <p:cNvSpPr>
+            <a:spLocks noGrp="1"/>
+          </p:cNvSpPr>
+          <p:nvPr>
+            <p:ph idx="1"/>
+          </p:nvPr>
+        </p:nvSpPr>
+        <p:spPr>
+          <a:xfrm>
+            <a:off x="609600" y="1524002"/>
+            <a:ext cx="10972800" cy="1161534"/>
+          </a:xfrm>
+        </p:spPr>
+        <p:txBody>
+          <a:bodyPr/>
+          <a:lstStyle/>
+          <a:p>
+            <a:r>
+              <a:rPr lang="en-US" dirty="0" smtClean="0"/>
+              <a:t>Normal liver parenchyma </a:t>
+            </a:r>
+            <a:r>
+              <a:rPr lang="en-US" dirty="0" smtClean="0"/>
+              <a:t>has shear stiffness &lt; 3 </a:t>
+            </a:r>
+            <a:r>
+              <a:rPr lang="en-US" dirty="0" err="1" smtClean="0"/>
+              <a:t>kPa</a:t>
+            </a:r>
+            <a:endParaRPr lang="en-US" dirty="0" smtClean="0"/>
+          </a:p>
+          <a:p>
+            <a:r>
+              <a:rPr lang="en-US" dirty="0" smtClean="0"/>
+              <a:t>Liver stiffness increases as histologic fibrosis increases</a:t>
+            </a:r>
+          </a:p>
+          <a:p>
+            <a:endParaRPr lang="en-US" dirty="0"/>
+          </a:p>
+        </p:txBody>
+      </p:sp>
+      <p:sp>
+        <p:nvSpPr>
+          <p:cNvPr id="5" name="Title 1"/>
+          <p:cNvSpPr>
+            <a:spLocks noGrp="1"/>
+          </p:cNvSpPr>
+          <p:nvPr>
+            <p:ph type="title"/>
+          </p:nvPr>
+        </p:nvSpPr>
+        <p:spPr>
+          <a:xfrm>
+            <a:off x="436606" y="407773"/>
+            <a:ext cx="10972800" cy="506627"/>
+          </a:xfrm>
+        </p:spPr>
+        <p:txBody>
+          <a:bodyPr>
+            <a:noAutofit/>
+          </a:bodyPr>
+          <a:lstStyle/>
+          <a:p>
+            <a:r>
+              <a:rPr lang="en-US" sz="3200" dirty="0" smtClean="0"/>
+              <a:t>Applying MRE to Liver </a:t>
+            </a:r>
+            <a:endParaRPr lang="en-US" sz="3200" dirty="0"/>
+          </a:p>
+        </p:txBody>
+      </p:sp>
+      <p:pic>
+        <p:nvPicPr>
+          <p:cNvPr id="6" name="Picture 5"/>
+          <p:cNvPicPr>
+            <a:picLocks noChangeAspect="1"/>
+          </p:cNvPicPr>
+          <p:nvPr/>
+        </p:nvPicPr>
+        <p:blipFill>
+          <a:blip r:embed="rId2"/>
+          <a:stretch>
+            <a:fillRect/>
+          </a:stretch>
+        </p:blipFill>
+        <p:spPr>
+          <a:xfrm>
+            <a:off x="436606" y="2842764"/>
+            <a:ext cx="3476175" cy="3596438"/>
+          </a:xfrm>
+          <a:prstGeom prst="rect">
+            <a:avLst/>
+          </a:prstGeom>
+        </p:spPr>
+      </p:pic>
+      <p:sp>
+        <p:nvSpPr>
+          <p:cNvPr id="7" name="Content Placeholder 1"/>
+          <p:cNvSpPr txBox="1">
+            <a:spLocks/>
+          </p:cNvSpPr>
+          <p:nvPr/>
+        </p:nvSpPr>
+        <p:spPr bwMode="auto">
+          <a:xfrm>
+            <a:off x="4407243" y="2622359"/>
+            <a:ext cx="7175157" cy="1161534"/>
+          </a:xfrm>
+          <a:prstGeom prst="rect">
+            <a:avLst/>
+          </a:prstGeom>
+          <a:noFill/>
+          <a:ln>
+            <a:noFill/>
+          </a:ln>
+          <a:effectLst/>
+          <a:extLst>
+            <a:ext uri="{909E8E84-426E-40DD-AFC4-6F175D3DCCD1}">
+              <a14:hiddenFill xmlns:a14="http://schemas.microsoft.com/office/drawing/2010/main">
+                <a:solidFill>
+                  <a:schemeClr val="accent1"/>
+                </a:solidFill>
+              </a14:hiddenFill>
+            </a:ext>
+            <a:ext uri="{91240B29-F687-4F45-9708-019B960494DF}">
+              <a14:hiddenLine xmlns:a14="http://schemas.microsoft.com/office/drawing/2010/main" w="9525">
+                <a:solidFill>
+                  <a:schemeClr val="tx1"/>
+                </a:solidFill>
+                <a:miter lim="800000"/>
+                <a:headEnd/>
+                <a:tailEnd/>
+              </a14:hiddenLine>
+            </a:ext>
+            <a:ext uri="{AF507438-7753-43E0-B8FC-AC1667EBCBE1}">
+              <a14:hiddenEffects xmlns:a14="http://schemas.microsoft.com/office/drawing/2010/main">
+                <a:effectLst>
+                  <a:outerShdw dist="35921" dir="2700000" algn="ctr" rotWithShape="0">
+                    <a:schemeClr val="bg2"/>
+                  </a:outerShdw>
+                </a:effectLst>
+              </a14:hiddenEffects>
+            </a:ext>
+          </a:extLst>
+        </p:spPr>
+        <p:txBody>
+          <a:bodyPr vert="horz" wrap="square" lIns="91440" tIns="45720" rIns="91440" bIns="45720" numCol="1" anchor="t" anchorCtr="0" compatLnSpc="1">
+            <a:prstTxWarp prst="textNoShape">
+              <a:avLst/>
+            </a:prstTxWarp>
+          </a:bodyPr>
+          <a:lstStyle>
+            <a:lvl1pPr marL="342900" indent="-342900" algn="l" rtl="0" eaLnBrk="1" fontAlgn="base" hangingPunct="1">
+              <a:spcBef>
+                <a:spcPct val="20000"/>
+              </a:spcBef>
+              <a:spcAft>
+                <a:spcPct val="0"/>
+              </a:spcAft>
+              <a:buChar char="•"/>
+              <a:defRPr sz="2600">
+                <a:solidFill>
+                  <a:schemeClr val="tx1"/>
+                </a:solidFill>
+                <a:latin typeface="+mn-lt"/>
+                <a:ea typeface="+mn-ea"/>
+                <a:cs typeface="+mn-cs"/>
+              </a:defRPr>
+            </a:lvl1pPr>
+            <a:lvl2pPr marL="742950" indent="-285750" algn="l" rtl="0" eaLnBrk="1" fontAlgn="base" hangingPunct="1">
+              <a:spcBef>
+                <a:spcPct val="20000"/>
+              </a:spcBef>
+              <a:spcAft>
+                <a:spcPct val="0"/>
+              </a:spcAft>
+              <a:buChar char="–"/>
+              <a:defRPr sz="2400">
+                <a:solidFill>
+                  <a:schemeClr val="tx1"/>
+                </a:solidFill>
+                <a:latin typeface="+mn-lt"/>
+              </a:defRPr>
+            </a:lvl2pPr>
+            <a:lvl3pPr marL="1143000" indent="-228600" algn="l" rtl="0" eaLnBrk="1" fontAlgn="base" hangingPunct="1">
+              <a:spcBef>
+                <a:spcPct val="20000"/>
+              </a:spcBef>
+              <a:spcAft>
+                <a:spcPct val="0"/>
+              </a:spcAft>
+              <a:buChar char="•"/>
+              <a:defRPr sz="2000">
+                <a:solidFill>
+                  <a:schemeClr val="tx1"/>
+                </a:solidFill>
+                <a:latin typeface="+mn-lt"/>
+              </a:defRPr>
+            </a:lvl3pPr>
+            <a:lvl4pPr marL="1600200" indent="-228600" algn="l" rtl="0" eaLnBrk="1" fontAlgn="base" hangingPunct="1">
+              <a:spcBef>
+                <a:spcPct val="20000"/>
+              </a:spcBef>
+              <a:spcAft>
+                <a:spcPct val="0"/>
+              </a:spcAft>
+              <a:buChar char="–"/>
+              <a:defRPr sz="1800">
+                <a:solidFill>
+                  <a:schemeClr val="tx1"/>
+                </a:solidFill>
+                <a:latin typeface="+mn-lt"/>
+              </a:defRPr>
+            </a:lvl4pPr>
+            <a:lvl5pPr marL="2057400" indent="-228600" algn="l" rtl="0" eaLnBrk="1" fontAlgn="base" hangingPunct="1">
+              <a:spcBef>
+                <a:spcPct val="20000"/>
+              </a:spcBef>
+              <a:spcAft>
+                <a:spcPct val="0"/>
+              </a:spcAft>
+              <a:buChar char="»"/>
+              <a:defRPr sz="1800">
+                <a:solidFill>
+                  <a:schemeClr val="tx1"/>
+                </a:solidFill>
+                <a:latin typeface="+mn-lt"/>
+              </a:defRPr>
+            </a:lvl5pPr>
+            <a:lvl6pPr marL="2514600" indent="-228600" algn="l" rtl="0" eaLnBrk="1" fontAlgn="base" hangingPunct="1">
+              <a:spcBef>
+                <a:spcPct val="20000"/>
+              </a:spcBef>
+              <a:spcAft>
+                <a:spcPct val="0"/>
+              </a:spcAft>
+              <a:buChar char="»"/>
+              <a:defRPr sz="2000">
+                <a:solidFill>
+                  <a:schemeClr val="tx1"/>
+                </a:solidFill>
+                <a:latin typeface="+mn-lt"/>
+              </a:defRPr>
+            </a:lvl6pPr>
+            <a:lvl7pPr marL="2971800" indent="-228600" algn="l" rtl="0" eaLnBrk="1" fontAlgn="base" hangingPunct="1">
+              <a:spcBef>
+                <a:spcPct val="20000"/>
+              </a:spcBef>
+              <a:spcAft>
+                <a:spcPct val="0"/>
+              </a:spcAft>
+              <a:buChar char="»"/>
+              <a:defRPr sz="2000">
+                <a:solidFill>
+                  <a:schemeClr val="tx1"/>
+                </a:solidFill>
+                <a:latin typeface="+mn-lt"/>
+              </a:defRPr>
+            </a:lvl7pPr>
+            <a:lvl8pPr marL="3429000" indent="-228600" algn="l" rtl="0" eaLnBrk="1" fontAlgn="base" hangingPunct="1">
+              <a:spcBef>
+                <a:spcPct val="20000"/>
+              </a:spcBef>
+              <a:spcAft>
+                <a:spcPct val="0"/>
+              </a:spcAft>
+              <a:buChar char="»"/>
+              <a:defRPr sz="2000">
+                <a:solidFill>
+                  <a:schemeClr val="tx1"/>
+                </a:solidFill>
+                <a:latin typeface="+mn-lt"/>
+              </a:defRPr>
+            </a:lvl8pPr>
+            <a:lvl9pPr marL="3886200" indent="-228600" algn="l" rtl="0" eaLnBrk="1" fontAlgn="base" hangingPunct="1">
+              <a:spcBef>
+                <a:spcPct val="20000"/>
+              </a:spcBef>
+              <a:spcAft>
+                <a:spcPct val="0"/>
+              </a:spcAft>
+              <a:buChar char="»"/>
+              <a:defRPr sz="2000">
+                <a:solidFill>
+                  <a:schemeClr val="tx1"/>
+                </a:solidFill>
+                <a:latin typeface="+mn-lt"/>
+              </a:defRPr>
+            </a:lvl9pPr>
+          </a:lstStyle>
+          <a:p>
+            <a:r>
+              <a:rPr lang="en-US" b="0" kern="0" dirty="0" err="1" smtClean="0"/>
+              <a:t>sfsf</a:t>
+            </a:r>
+            <a:endParaRPr lang="en-US" b="0" kern="0" dirty="0"/>
+          </a:p>
+        </p:txBody>
+      </p:sp>
+    </p:spTree>
+    <p:extLst>
+      <p:ext uri="{BB962C8B-B14F-4D97-AF65-F5344CB8AC3E}">
+        <p14:creationId xmlns:p14="http://schemas.microsoft.com/office/powerpoint/2010/main" val="1900716790"/>
+      </p:ext>
+    </p:extLst>
+  </p:cSld>
+  <p:clrMapOvr>
+    <a:masterClrMapping/>
+  </p:clrMapOvr>
+</p:sld>
+</file>
+
+<file path=ppt/slides/slide11.xml><?xml version="1.0" encoding="utf-8"?>
+<p:sld xmlns:a="http://schemas.openxmlformats.org/drawingml/2006/main" xmlns:r="http://schemas.openxmlformats.org/officeDocument/2006/relationships" xmlns:p="http://schemas.openxmlformats.org/presentationml/2006/main">
+  <p:cSld>
+    <p:spTree>
+      <p:nvGrpSpPr>
+        <p:cNvPr id="1" name=""/>
+        <p:cNvGrpSpPr/>
+        <p:nvPr/>
+      </p:nvGrpSpPr>
+      <p:grpSpPr>
+        <a:xfrm>
+          <a:off x="0" y="0"/>
+          <a:ext cx="0" cy="0"/>
+          <a:chOff x="0" y="0"/>
+          <a:chExt cx="0" cy="0"/>
+        </a:xfrm>
+      </p:grpSpPr>
+      <p:sp>
+        <p:nvSpPr>
+          <p:cNvPr id="2" name="Content Placeholder 1"/>
+          <p:cNvSpPr>
+            <a:spLocks noGrp="1"/>
+          </p:cNvSpPr>
+          <p:nvPr>
+            <p:ph idx="1"/>
+          </p:nvPr>
+        </p:nvSpPr>
+        <p:spPr/>
+        <p:txBody>
+          <a:bodyPr/>
+          <a:lstStyle/>
+          <a:p>
+            <a:endParaRPr lang="en-US" dirty="0"/>
+          </a:p>
+        </p:txBody>
+      </p:sp>
+      <p:sp>
+        <p:nvSpPr>
+          <p:cNvPr id="5" name="Title 1"/>
+          <p:cNvSpPr>
+            <a:spLocks noGrp="1"/>
+          </p:cNvSpPr>
+          <p:nvPr>
+            <p:ph type="title"/>
+          </p:nvPr>
+        </p:nvSpPr>
+        <p:spPr>
+          <a:xfrm>
+            <a:off x="436606" y="407773"/>
+            <a:ext cx="10972800" cy="506627"/>
+          </a:xfrm>
+        </p:spPr>
+        <p:txBody>
+          <a:bodyPr>
+            <a:noAutofit/>
+          </a:bodyPr>
+          <a:lstStyle/>
+          <a:p>
+            <a:r>
+              <a:rPr lang="en-US" sz="3200" dirty="0" smtClean="0"/>
+              <a:t>Clinical Applications </a:t>
+            </a:r>
+            <a:endParaRPr lang="en-US" sz="3200" dirty="0"/>
+          </a:p>
+        </p:txBody>
+      </p:sp>
+    </p:spTree>
+    <p:extLst>
+      <p:ext uri="{BB962C8B-B14F-4D97-AF65-F5344CB8AC3E}">
+        <p14:creationId xmlns:p14="http://schemas.microsoft.com/office/powerpoint/2010/main" val="526007881"/>
+      </p:ext>
+    </p:extLst>
+  </p:cSld>
+  <p:clrMapOvr>
+    <a:masterClrMapping/>
+  </p:clrMapOvr>
+</p:sld>
+</file>
+
+<file path=ppt/slides/slide12.xml><?xml version="1.0" encoding="utf-8"?>
+<p:sld xmlns:a="http://schemas.openxmlformats.org/drawingml/2006/main" xmlns:r="http://schemas.openxmlformats.org/officeDocument/2006/relationships" xmlns:p="http://schemas.openxmlformats.org/presentationml/2006/main">
+  <p:cSld>
+    <p:spTree>
+      <p:nvGrpSpPr>
+        <p:cNvPr id="1" name=""/>
+        <p:cNvGrpSpPr/>
+        <p:nvPr/>
+      </p:nvGrpSpPr>
+      <p:grpSpPr>
+        <a:xfrm>
+          <a:off x="0" y="0"/>
+          <a:ext cx="0" cy="0"/>
+          <a:chOff x="0" y="0"/>
+          <a:chExt cx="0" cy="0"/>
+        </a:xfrm>
+      </p:grpSpPr>
+      <p:sp>
+        <p:nvSpPr>
+          <p:cNvPr id="2" name="Content Placeholder 1"/>
+          <p:cNvSpPr>
+            <a:spLocks noGrp="1"/>
+          </p:cNvSpPr>
+          <p:nvPr>
+            <p:ph idx="1"/>
+          </p:nvPr>
+        </p:nvSpPr>
+        <p:spPr/>
+        <p:txBody>
+          <a:bodyPr/>
+          <a:lstStyle/>
+          <a:p>
+            <a:endParaRPr lang="en-US" dirty="0"/>
+          </a:p>
+        </p:txBody>
+      </p:sp>
+      <p:sp>
+        <p:nvSpPr>
+          <p:cNvPr id="5" name="Title 1"/>
+          <p:cNvSpPr>
+            <a:spLocks noGrp="1"/>
+          </p:cNvSpPr>
+          <p:nvPr>
+            <p:ph type="title"/>
+          </p:nvPr>
+        </p:nvSpPr>
+        <p:spPr>
+          <a:xfrm>
+            <a:off x="436606" y="407773"/>
+            <a:ext cx="10972800" cy="506627"/>
+          </a:xfrm>
+        </p:spPr>
+        <p:txBody>
+          <a:bodyPr>
+            <a:noAutofit/>
+          </a:bodyPr>
+          <a:lstStyle/>
+          <a:p>
+            <a:r>
+              <a:rPr lang="en-US" sz="3200" dirty="0" smtClean="0"/>
+              <a:t>Clinical Applications </a:t>
+            </a:r>
+            <a:endParaRPr lang="en-US" sz="3200" dirty="0"/>
+          </a:p>
+        </p:txBody>
+      </p:sp>
+    </p:spTree>
+    <p:extLst>
+      <p:ext uri="{BB962C8B-B14F-4D97-AF65-F5344CB8AC3E}">
+        <p14:creationId xmlns:p14="http://schemas.microsoft.com/office/powerpoint/2010/main" val="4000284986"/>
+      </p:ext>
+    </p:extLst>
+  </p:cSld>
+  <p:clrMapOvr>
+    <a:masterClrMapping/>
+  </p:clrMapOvr>
+</p:sld>
+</file>
+
+<file path=ppt/slides/slide13.xml><?xml version="1.0" encoding="utf-8"?>
+<p:sld xmlns:a="http://schemas.openxmlformats.org/drawingml/2006/main" xmlns:r="http://schemas.openxmlformats.org/officeDocument/2006/relationships" xmlns:p="http://schemas.openxmlformats.org/presentationml/2006/main">
+  <p:cSld>
+    <p:spTree>
+      <p:nvGrpSpPr>
+        <p:cNvPr id="1" name=""/>
+        <p:cNvGrpSpPr/>
+        <p:nvPr/>
+      </p:nvGrpSpPr>
+      <p:grpSpPr>
+        <a:xfrm>
+          <a:off x="0" y="0"/>
+          <a:ext cx="0" cy="0"/>
+          <a:chOff x="0" y="0"/>
+          <a:chExt cx="0" cy="0"/>
+        </a:xfrm>
+      </p:grpSpPr>
+      <p:sp>
+        <p:nvSpPr>
+          <p:cNvPr id="2" name="Content Placeholder 1"/>
+          <p:cNvSpPr>
+            <a:spLocks noGrp="1"/>
+          </p:cNvSpPr>
+          <p:nvPr>
+            <p:ph idx="1"/>
+          </p:nvPr>
+        </p:nvSpPr>
+        <p:spPr/>
+        <p:txBody>
+          <a:bodyPr/>
+          <a:lstStyle/>
+          <a:p>
+            <a:pPr marL="0" indent="0">
+              <a:buNone/>
+            </a:pPr>
+            <a:r>
+              <a:rPr lang="en-US" sz="2400" u="sng" dirty="0" smtClean="0"/>
+              <a:t>Benefits</a:t>
+            </a:r>
+          </a:p>
+          <a:p>
+            <a:r>
+              <a:rPr lang="en-US" sz="2400" dirty="0" smtClean="0"/>
+              <a:t>Quick scan</a:t>
+            </a:r>
+          </a:p>
+          <a:p>
+            <a:r>
+              <a:rPr lang="en-US" sz="2400" dirty="0" smtClean="0"/>
+              <a:t>Can </a:t>
+            </a:r>
+            <a:r>
+              <a:rPr lang="en-US" sz="2400" dirty="0" smtClean="0"/>
+              <a:t>be easily incorporated into liver protocols</a:t>
+            </a:r>
+          </a:p>
+          <a:p>
+            <a:pPr lvl="1"/>
+            <a:r>
+              <a:rPr lang="en-US" sz="2000" dirty="0" smtClean="0"/>
+              <a:t>Dixon/IDEAL (measure fat)</a:t>
+            </a:r>
+          </a:p>
+          <a:p>
+            <a:pPr lvl="1"/>
+            <a:r>
+              <a:rPr lang="en-US" sz="2000" dirty="0" smtClean="0"/>
+              <a:t>Diffusion Weighted (lesions, fibrosis)</a:t>
+            </a:r>
+          </a:p>
+          <a:p>
+            <a:pPr lvl="1"/>
+            <a:r>
+              <a:rPr lang="en-US" sz="2000" dirty="0" smtClean="0"/>
+              <a:t>MRE (visualizing varices</a:t>
+            </a:r>
+          </a:p>
+          <a:p>
+            <a:pPr lvl="1"/>
+            <a:r>
+              <a:rPr lang="en-US" sz="2000" dirty="0" smtClean="0"/>
+              <a:t>4D flow (flow in varices and portal hepatic system</a:t>
+            </a:r>
+            <a:r>
+              <a:rPr lang="en-US" sz="2000" dirty="0" smtClean="0"/>
+              <a:t>)</a:t>
+            </a:r>
+          </a:p>
+          <a:p>
+            <a:r>
+              <a:rPr lang="en-US" sz="2400" dirty="0" smtClean="0"/>
+              <a:t>Reproducible across vendors and field strengths</a:t>
+            </a:r>
+            <a:endParaRPr lang="en-US" sz="2400" dirty="0" smtClean="0"/>
+          </a:p>
+          <a:p>
+            <a:pPr marL="0" indent="0">
+              <a:buNone/>
+            </a:pPr>
+            <a:r>
+              <a:rPr lang="en-US" sz="2400" u="sng" dirty="0" smtClean="0"/>
+              <a:t>Downsides</a:t>
+            </a:r>
+            <a:endParaRPr lang="en-US" sz="2400" u="sng" dirty="0" smtClean="0"/>
+          </a:p>
+          <a:p>
+            <a:r>
+              <a:rPr lang="en-US" sz="2400" dirty="0" smtClean="0"/>
+              <a:t>Lower resolution </a:t>
+            </a:r>
+          </a:p>
+          <a:p>
+            <a:r>
+              <a:rPr lang="en-US" sz="2400" dirty="0" smtClean="0"/>
+              <a:t>Require breath-hold</a:t>
+            </a:r>
+            <a:endParaRPr lang="en-US" sz="2400" dirty="0"/>
+          </a:p>
+        </p:txBody>
+      </p:sp>
+      <p:sp>
+        <p:nvSpPr>
+          <p:cNvPr id="5" name="Title 1"/>
+          <p:cNvSpPr>
+            <a:spLocks noGrp="1"/>
+          </p:cNvSpPr>
+          <p:nvPr>
+            <p:ph type="title"/>
+          </p:nvPr>
+        </p:nvSpPr>
+        <p:spPr>
+          <a:xfrm>
+            <a:off x="436606" y="407773"/>
+            <a:ext cx="10972800" cy="506627"/>
+          </a:xfrm>
+        </p:spPr>
+        <p:txBody>
+          <a:bodyPr>
+            <a:noAutofit/>
+          </a:bodyPr>
+          <a:lstStyle/>
+          <a:p>
+            <a:r>
+              <a:rPr lang="en-US" sz="3200" dirty="0" smtClean="0"/>
+              <a:t>Conclusion</a:t>
+            </a:r>
+            <a:endParaRPr lang="en-US" sz="3200" dirty="0"/>
+          </a:p>
+        </p:txBody>
+      </p:sp>
+    </p:spTree>
+    <p:extLst>
+      <p:ext uri="{BB962C8B-B14F-4D97-AF65-F5344CB8AC3E}">
+        <p14:creationId xmlns:p14="http://schemas.microsoft.com/office/powerpoint/2010/main" val="1977236892"/>
+      </p:ext>
+    </p:extLst>
+  </p:cSld>
+  <p:clrMapOvr>
+    <a:masterClrMapping/>
+  </p:clrMapOvr>
+</p:sld>
+</file>
+
+<file path=ppt/slides/slide14.xml><?xml version="1.0" encoding="utf-8"?>
+<p:sld xmlns:a="http://schemas.openxmlformats.org/drawingml/2006/main" xmlns:r="http://schemas.openxmlformats.org/officeDocument/2006/relationships" xmlns:p="http://schemas.openxmlformats.org/presentationml/2006/main">
+  <p:cSld>
+    <p:spTree>
+      <p:nvGrpSpPr>
+        <p:cNvPr id="1" name=""/>
+        <p:cNvGrpSpPr/>
+        <p:nvPr/>
+      </p:nvGrpSpPr>
+      <p:grpSpPr>
+        <a:xfrm>
+          <a:off x="0" y="0"/>
+          <a:ext cx="0" cy="0"/>
+          <a:chOff x="0" y="0"/>
+          <a:chExt cx="0" cy="0"/>
+        </a:xfrm>
+      </p:grpSpPr>
+      <p:sp>
+        <p:nvSpPr>
+          <p:cNvPr id="2" name="Content Placeholder 1"/>
+          <p:cNvSpPr>
+            <a:spLocks noGrp="1"/>
+          </p:cNvSpPr>
+          <p:nvPr>
+            <p:ph idx="1"/>
+          </p:nvPr>
+        </p:nvSpPr>
+        <p:spPr/>
+        <p:txBody>
+          <a:bodyPr/>
+          <a:lstStyle/>
+          <a:p>
+            <a:r>
+              <a:rPr lang="en-US" sz="1800" dirty="0" err="1">
+                <a:latin typeface="Calibri" panose="020F0502020204030204" pitchFamily="34" charset="0"/>
+                <a:ea typeface="Calibri" panose="020F0502020204030204" pitchFamily="34" charset="0"/>
+                <a:cs typeface="Calibri" panose="020F0502020204030204" pitchFamily="34" charset="0"/>
+              </a:rPr>
+              <a:t>Venkatesh</a:t>
+            </a:r>
+            <a:r>
+              <a:rPr lang="en-US" sz="1800" dirty="0">
+                <a:latin typeface="Calibri" panose="020F0502020204030204" pitchFamily="34" charset="0"/>
+                <a:ea typeface="Calibri" panose="020F0502020204030204" pitchFamily="34" charset="0"/>
+                <a:cs typeface="Calibri" panose="020F0502020204030204" pitchFamily="34" charset="0"/>
+              </a:rPr>
+              <a:t> SK, Yin M, </a:t>
+            </a:r>
+            <a:r>
+              <a:rPr lang="en-US" sz="1800" dirty="0" err="1">
+                <a:latin typeface="Calibri" panose="020F0502020204030204" pitchFamily="34" charset="0"/>
+                <a:ea typeface="Calibri" panose="020F0502020204030204" pitchFamily="34" charset="0"/>
+                <a:cs typeface="Calibri" panose="020F0502020204030204" pitchFamily="34" charset="0"/>
+              </a:rPr>
+              <a:t>Ehman</a:t>
+            </a:r>
+            <a:r>
+              <a:rPr lang="en-US" sz="1800" dirty="0">
+                <a:latin typeface="Calibri" panose="020F0502020204030204" pitchFamily="34" charset="0"/>
+                <a:ea typeface="Calibri" panose="020F0502020204030204" pitchFamily="34" charset="0"/>
+                <a:cs typeface="Calibri" panose="020F0502020204030204" pitchFamily="34" charset="0"/>
+              </a:rPr>
+              <a:t> RL. Magnetic Resonance Elastography of Liver: Technique, Analysis, and Clinical Applications. </a:t>
+            </a:r>
+            <a:r>
+              <a:rPr lang="en-US" sz="1800" dirty="0" smtClean="0">
+                <a:latin typeface="Calibri" panose="020F0502020204030204" pitchFamily="34" charset="0"/>
+                <a:ea typeface="Calibri" panose="020F0502020204030204" pitchFamily="34" charset="0"/>
+                <a:cs typeface="Calibri" panose="020F0502020204030204" pitchFamily="34" charset="0"/>
+              </a:rPr>
+              <a:t>2013;37:544–555</a:t>
+            </a:r>
+          </a:p>
+          <a:p>
+            <a:r>
+              <a:rPr lang="en-US" sz="1800" dirty="0"/>
+              <a:t>Xiao H, Shi M, </a:t>
+            </a:r>
+            <a:r>
+              <a:rPr lang="en-US" sz="1800" dirty="0" err="1"/>
+              <a:t>Xie</a:t>
+            </a:r>
+            <a:r>
+              <a:rPr lang="en-US" sz="1800" dirty="0"/>
+              <a:t> Y, Chi X. Comparison of diagnostic accuracy of magnetic resonance </a:t>
+            </a:r>
+            <a:r>
+              <a:rPr lang="en-US" sz="1800" dirty="0" err="1"/>
+              <a:t>elastography</a:t>
+            </a:r>
+            <a:r>
+              <a:rPr lang="en-US" sz="1800" dirty="0"/>
+              <a:t> and Fibroscan for detecting liver fibrosis in chronic hepatitis B patients: A systematic review and meta-analysis. </a:t>
+            </a:r>
+            <a:r>
+              <a:rPr lang="en-US" sz="1800" dirty="0" err="1"/>
+              <a:t>PLoS</a:t>
+            </a:r>
+            <a:r>
+              <a:rPr lang="en-US" sz="1800" dirty="0"/>
+              <a:t> One 2017;12:1–14</a:t>
+            </a:r>
+            <a:r>
+              <a:rPr lang="en-US" sz="1800" dirty="0" smtClean="0"/>
+              <a:t>.</a:t>
+            </a:r>
+          </a:p>
+          <a:p>
+            <a:r>
+              <a:rPr lang="en-US" sz="1800" dirty="0"/>
+              <a:t>Murphy MC, Jones DT, Jack CR, et al. Regional brain stiffness changes across the Alzheimer’s disease spectrum. NeuroImage Clin 2016;10:283–290.</a:t>
+            </a:r>
+            <a:endParaRPr lang="en-US" sz="1200" dirty="0"/>
+          </a:p>
+          <a:p>
+            <a:endParaRPr lang="en-US" sz="1800" dirty="0" smtClean="0">
+              <a:latin typeface="Calibri" panose="020F0502020204030204" pitchFamily="34" charset="0"/>
+              <a:ea typeface="Calibri" panose="020F0502020204030204" pitchFamily="34" charset="0"/>
+              <a:cs typeface="Calibri" panose="020F0502020204030204" pitchFamily="34" charset="0"/>
+            </a:endParaRPr>
+          </a:p>
+          <a:p>
+            <a:endParaRPr lang="en-US" sz="1800" dirty="0"/>
+          </a:p>
+        </p:txBody>
+      </p:sp>
+      <p:sp>
+        <p:nvSpPr>
+          <p:cNvPr id="3" name="Title 2"/>
+          <p:cNvSpPr>
+            <a:spLocks noGrp="1"/>
+          </p:cNvSpPr>
+          <p:nvPr>
+            <p:ph type="title"/>
+          </p:nvPr>
+        </p:nvSpPr>
+        <p:spPr/>
+        <p:txBody>
+          <a:bodyPr/>
+          <a:lstStyle/>
+          <a:p>
+            <a:r>
+              <a:rPr lang="en-US" dirty="0" smtClean="0"/>
+              <a:t>References</a:t>
+            </a:r>
+            <a:endParaRPr lang="en-US" dirty="0"/>
+          </a:p>
+        </p:txBody>
+      </p:sp>
+    </p:spTree>
+    <p:extLst>
+      <p:ext uri="{BB962C8B-B14F-4D97-AF65-F5344CB8AC3E}">
+        <p14:creationId xmlns:p14="http://schemas.microsoft.com/office/powerpoint/2010/main" val="34689496"/>
+      </p:ext>
+    </p:extLst>
+  </p:cSld>
+  <p:clrMapOvr>
+    <a:masterClrMapping/>
+  </p:clrMapOvr>
+</p:sld>
+</file>
+
+<file path=ppt/slides/slide15.xml><?xml version="1.0" encoding="utf-8"?>
+<p:sld xmlns:a="http://schemas.openxmlformats.org/drawingml/2006/main" xmlns:r="http://schemas.openxmlformats.org/officeDocument/2006/relationships" xmlns:p="http://schemas.openxmlformats.org/presentationml/2006/main">
+  <p:cSld>
+    <p:spTree>
+      <p:nvGrpSpPr>
+        <p:cNvPr id="1" name=""/>
+        <p:cNvGrpSpPr/>
+        <p:nvPr/>
+      </p:nvGrpSpPr>
+      <p:grpSpPr>
+        <a:xfrm>
+          <a:off x="0" y="0"/>
+          <a:ext cx="0" cy="0"/>
+          <a:chOff x="0" y="0"/>
+          <a:chExt cx="0" cy="0"/>
+        </a:xfrm>
+      </p:grpSpPr>
+      <p:sp>
+        <p:nvSpPr>
+          <p:cNvPr id="2" name="Content Placeholder 1"/>
+          <p:cNvSpPr>
+            <a:spLocks noGrp="1"/>
+          </p:cNvSpPr>
+          <p:nvPr>
+            <p:ph idx="1"/>
+          </p:nvPr>
+        </p:nvSpPr>
+        <p:spPr>
+          <a:xfrm>
+            <a:off x="3945924" y="2438401"/>
+            <a:ext cx="3830595" cy="1037967"/>
+          </a:xfrm>
+        </p:spPr>
+        <p:txBody>
+          <a:bodyPr/>
+          <a:lstStyle/>
+          <a:p>
+            <a:pPr marL="0" indent="0">
+              <a:buNone/>
+            </a:pPr>
+            <a:r>
+              <a:rPr lang="en-US" sz="5400" dirty="0" smtClean="0">
+                <a:latin typeface="Calibri" panose="020F0502020204030204" pitchFamily="34" charset="0"/>
+                <a:ea typeface="Calibri" panose="020F0502020204030204" pitchFamily="34" charset="0"/>
+                <a:cs typeface="Calibri" panose="020F0502020204030204" pitchFamily="34" charset="0"/>
+              </a:rPr>
+              <a:t>Questions?</a:t>
+            </a:r>
+            <a:endParaRPr lang="en-US" sz="4000" dirty="0"/>
+          </a:p>
+          <a:p>
+            <a:endParaRPr lang="en-US" sz="1800" dirty="0" smtClean="0">
+              <a:latin typeface="Calibri" panose="020F0502020204030204" pitchFamily="34" charset="0"/>
+              <a:ea typeface="Calibri" panose="020F0502020204030204" pitchFamily="34" charset="0"/>
+              <a:cs typeface="Calibri" panose="020F0502020204030204" pitchFamily="34" charset="0"/>
+            </a:endParaRPr>
+          </a:p>
+          <a:p>
+            <a:endParaRPr lang="en-US" sz="1800" dirty="0"/>
+          </a:p>
+        </p:txBody>
+      </p:sp>
+      <p:sp>
+        <p:nvSpPr>
+          <p:cNvPr id="3" name="Title 2"/>
+          <p:cNvSpPr>
+            <a:spLocks noGrp="1"/>
+          </p:cNvSpPr>
+          <p:nvPr>
+            <p:ph type="title"/>
+          </p:nvPr>
+        </p:nvSpPr>
+        <p:spPr/>
+        <p:txBody>
+          <a:bodyPr/>
+          <a:lstStyle/>
+          <a:p>
+            <a:r>
+              <a:rPr lang="en-US" dirty="0" smtClean="0"/>
+              <a:t>Questions</a:t>
+            </a:r>
+            <a:endParaRPr lang="en-US" dirty="0"/>
+          </a:p>
+        </p:txBody>
+      </p:sp>
+    </p:spTree>
+    <p:extLst>
+      <p:ext uri="{BB962C8B-B14F-4D97-AF65-F5344CB8AC3E}">
+        <p14:creationId xmlns:p14="http://schemas.microsoft.com/office/powerpoint/2010/main" val="3768163423"/>
+      </p:ext>
+    </p:extLst>
+  </p:cSld>
+  <p:clrMapOvr>
+    <a:masterClrMapping/>
+  </p:clrMapOvr>
 </p:sld>
 </file>
 
@@ -41578,26 +43079,49 @@
           <a:p>
             <a:r>
               <a:rPr lang="en-US" dirty="0" smtClean="0"/>
-              <a:t>Typically short TR, short TE, and low flip angle</a:t>
+              <a:t>Introduction</a:t>
             </a:r>
           </a:p>
           <a:p>
             <a:r>
               <a:rPr lang="en-US" dirty="0" smtClean="0"/>
-              <a:t>Total time ~ 1 minute</a:t>
+              <a:t>Liver Fibrosis</a:t>
             </a:r>
           </a:p>
           <a:p>
             <a:r>
               <a:rPr lang="en-US" dirty="0" smtClean="0"/>
-              <a:t>Move only microns displacement</a:t>
+              <a:t>Basic Principles of MRE</a:t>
             </a:r>
           </a:p>
           <a:p>
             <a:r>
               <a:rPr lang="en-US" dirty="0" smtClean="0"/>
-              <a:t>30 – 500 Hz</a:t>
-            </a:r>
+              <a:t>MRE Sequence</a:t>
+            </a:r>
+          </a:p>
+          <a:p>
+            <a:r>
+              <a:rPr lang="en-US" dirty="0" smtClean="0"/>
+              <a:t>Post-processing (Production of Elastograms)</a:t>
+            </a:r>
+          </a:p>
+          <a:p>
+            <a:r>
+              <a:rPr lang="en-US" dirty="0" smtClean="0"/>
+              <a:t>Clinical Applications</a:t>
+            </a:r>
+          </a:p>
+          <a:p>
+            <a:r>
+              <a:rPr lang="en-US" dirty="0" smtClean="0"/>
+              <a:t>Conclusion</a:t>
+            </a:r>
+          </a:p>
+          <a:p>
+            <a:endParaRPr lang="en-US" dirty="0" smtClean="0"/>
+          </a:p>
+          <a:p>
             <a:endParaRPr lang="en-US" dirty="0"/>
           </a:p>
         </p:txBody>
@@ -41626,7 +43150,7 @@
           <a:p>
             <a:r>
               <a:rPr lang="en-US" sz="3200" dirty="0" smtClean="0"/>
-              <a:t>Introduction</a:t>
+              <a:t>Outline</a:t>
             </a:r>
             <a:endParaRPr lang="en-US" sz="3200" dirty="0"/>
           </a:p>
@@ -41642,6 +43166,13 @@
   <p:clrMapOvr>
     <a:masterClrMapping/>
   </p:clrMapOvr>
+  <p:timing>
+    <p:tnLst>
+      <p:par>
+        <p:cTn id="1" dur="indefinite" restart="never" nodeType="tmRoot"/>
+      </p:par>
+    </p:tnLst>
+  </p:timing>
 </p:sld>
 </file>
 
@@ -41672,10 +43203,79 @@
             <p:ph idx="1"/>
           </p:nvPr>
         </p:nvSpPr>
-        <p:spPr/>
+        <p:spPr>
+          <a:xfrm>
+            <a:off x="609600" y="1524001"/>
+            <a:ext cx="10972800" cy="3772929"/>
+          </a:xfrm>
+        </p:spPr>
         <p:txBody>
           <a:bodyPr/>
           <a:lstStyle/>
+          <a:p>
+            <a:r>
+              <a:rPr lang="en-US" dirty="0" smtClean="0"/>
+              <a:t>Mechanical properties of tissues often change during disease</a:t>
+            </a:r>
+          </a:p>
+          <a:p>
+            <a:pPr lvl="1"/>
+            <a:r>
+              <a:rPr lang="en-US" dirty="0"/>
+              <a:t>Tumor (hard) vs. benign lipoma (soft</a:t>
+            </a:r>
+            <a:r>
+              <a:rPr lang="en-US" dirty="0" smtClean="0"/>
+              <a:t>)</a:t>
+            </a:r>
+          </a:p>
+          <a:p>
+            <a:pPr lvl="1"/>
+            <a:r>
+              <a:rPr lang="en-US" dirty="0"/>
+              <a:t>Muscle stiffness (muscular dystrophy</a:t>
+            </a:r>
+            <a:r>
+              <a:rPr lang="en-US" dirty="0" smtClean="0"/>
+              <a:t>)</a:t>
+            </a:r>
+          </a:p>
+          <a:p>
+            <a:pPr lvl="1"/>
+            <a:r>
+              <a:rPr lang="en-US" dirty="0" smtClean="0"/>
+              <a:t>Viscoelasticity brain parenchyma </a:t>
+            </a:r>
+          </a:p>
+          <a:p>
+            <a:pPr lvl="1"/>
+            <a:r>
+              <a:rPr lang="en-US" dirty="0" smtClean="0"/>
+              <a:t>Liver fibrosis</a:t>
+            </a:r>
+          </a:p>
+          <a:p>
+            <a:endParaRPr lang="en-US" dirty="0" smtClean="0"/>
+          </a:p>
+          <a:p>
+            <a:r>
+              <a:rPr lang="en-US" dirty="0" smtClean="0"/>
+              <a:t>Palpation has been used for centuries</a:t>
+            </a:r>
+          </a:p>
+          <a:p>
+            <a:r>
+              <a:rPr lang="en-US" dirty="0" smtClean="0"/>
+              <a:t>MRE allows quantitative analysis of mechanical properties</a:t>
+            </a:r>
+          </a:p>
+          <a:p>
+            <a:pPr lvl="1"/>
+            <a:r>
+              <a:rPr lang="en-US" dirty="0" smtClean="0"/>
+              <a:t>“Virtual palpation”</a:t>
+            </a:r>
+          </a:p>
           <a:p>
             <a:endParaRPr lang="en-US" dirty="0"/>
           </a:p>
@@ -41708,6 +43308,66 @@
               <a:t>Introduction</a:t>
             </a:r>
             <a:endParaRPr lang="en-US" sz="3200" dirty="0"/>
+          </a:p>
+        </p:txBody>
+      </p:sp>
+      <p:pic>
+        <p:nvPicPr>
+          <p:cNvPr id="4" name="Picture 3"/>
+          <p:cNvPicPr>
+            <a:picLocks noChangeAspect="1"/>
+          </p:cNvPicPr>
+          <p:nvPr/>
+        </p:nvPicPr>
+        <p:blipFill>
+          <a:blip r:embed="rId3"/>
+          <a:stretch>
+            <a:fillRect/>
+          </a:stretch>
+        </p:blipFill>
+        <p:spPr>
+          <a:xfrm>
+            <a:off x="7002411" y="2079153"/>
+            <a:ext cx="4275189" cy="2097431"/>
+          </a:xfrm>
+          <a:prstGeom prst="rect">
+            <a:avLst/>
+          </a:prstGeom>
+        </p:spPr>
+      </p:pic>
+      <p:sp>
+        <p:nvSpPr>
+          <p:cNvPr id="5" name="TextBox 4"/>
+          <p:cNvSpPr txBox="1"/>
+          <p:nvPr/>
+        </p:nvSpPr>
+        <p:spPr>
+          <a:xfrm>
+            <a:off x="6911546" y="4176584"/>
+            <a:ext cx="4950940" cy="830997"/>
+          </a:xfrm>
+          <a:prstGeom prst="rect">
+            <a:avLst/>
+          </a:prstGeom>
+          <a:noFill/>
+        </p:spPr>
+        <p:txBody>
+          <a:bodyPr wrap="square" rtlCol="0">
+            <a:spAutoFit/>
+          </a:bodyPr>
+          <a:lstStyle/>
+          <a:p>
+            <a:r>
+              <a:rPr lang="en-US" sz="1050" b="0" i="1" dirty="0" smtClean="0"/>
+              <a:t>Murphy </a:t>
+            </a:r>
+            <a:r>
+              <a:rPr lang="en-US" sz="1050" b="0" i="1" dirty="0"/>
+              <a:t>MC, Jones DT, Jack CR, et al. Regional brain stiffness changes across the Alzheimer’s disease spectrum. NeuroImage Clin 2016;10:283–290.</a:t>
+            </a:r>
+          </a:p>
+          <a:p>
+            <a:endParaRPr lang="en-US" dirty="0"/>
           </a:p>
         </p:txBody>
       </p:sp>
@@ -41721,10 +43381,1213 @@
   <p:clrMapOvr>
     <a:masterClrMapping/>
   </p:clrMapOvr>
+  <p:timing>
+    <p:tnLst>
+      <p:par>
+        <p:cTn id="1" dur="indefinite" restart="never" nodeType="tmRoot"/>
+      </p:par>
+    </p:tnLst>
+  </p:timing>
 </p:sld>
 </file>
 
 <file path=ppt/slides/slide4.xml><?xml version="1.0" encoding="utf-8"?>
+<p:sld xmlns:a="http://schemas.openxmlformats.org/drawingml/2006/main" xmlns:r="http://schemas.openxmlformats.org/officeDocument/2006/relationships" xmlns:p="http://schemas.openxmlformats.org/presentationml/2006/main">
+  <p:cSld>
+    <p:spTree>
+      <p:nvGrpSpPr>
+        <p:cNvPr id="1" name=""/>
+        <p:cNvGrpSpPr/>
+        <p:nvPr/>
+      </p:nvGrpSpPr>
+      <p:grpSpPr>
+        <a:xfrm>
+          <a:off x="0" y="0"/>
+          <a:ext cx="0" cy="0"/>
+          <a:chOff x="0" y="0"/>
+          <a:chExt cx="0" cy="0"/>
+        </a:xfrm>
+      </p:grpSpPr>
+      <p:sp>
+        <p:nvSpPr>
+          <p:cNvPr id="3" name="Content Placeholder 2"/>
+          <p:cNvSpPr>
+            <a:spLocks noGrp="1"/>
+          </p:cNvSpPr>
+          <p:nvPr>
+            <p:ph idx="1"/>
+          </p:nvPr>
+        </p:nvSpPr>
+        <p:spPr>
+          <a:xfrm>
+            <a:off x="436606" y="1422276"/>
+            <a:ext cx="10972800" cy="5206313"/>
+          </a:xfrm>
+        </p:spPr>
+        <p:txBody>
+          <a:bodyPr/>
+          <a:lstStyle/>
+          <a:p>
+            <a:r>
+              <a:rPr lang="en-US" sz="2000" dirty="0"/>
+              <a:t>Caused by various diseases</a:t>
+            </a:r>
+          </a:p>
+          <a:p>
+            <a:pPr lvl="1"/>
+            <a:r>
+              <a:rPr lang="en-US" sz="1800" dirty="0"/>
+              <a:t>Hepatitis A,B,C, alcoholism, portal vein thrombosis, NAFLD</a:t>
+            </a:r>
+            <a:endParaRPr lang="en-US" sz="2000" dirty="0"/>
+          </a:p>
+          <a:p>
+            <a:r>
+              <a:rPr lang="en-US" sz="2000" dirty="0"/>
+              <a:t>Fibrosis is reversible at early </a:t>
+            </a:r>
+            <a:r>
+              <a:rPr lang="en-US" sz="2000" dirty="0" smtClean="0"/>
+              <a:t>stages</a:t>
+            </a:r>
+          </a:p>
+          <a:p>
+            <a:r>
+              <a:rPr lang="en-US" sz="2000" dirty="0" smtClean="0"/>
+              <a:t>Diagnosing </a:t>
+            </a:r>
+            <a:r>
+              <a:rPr lang="en-US" sz="2000" dirty="0"/>
+              <a:t>fibrosis</a:t>
+            </a:r>
+          </a:p>
+          <a:p>
+            <a:pPr lvl="1"/>
+            <a:r>
+              <a:rPr lang="en-US" sz="1800" dirty="0"/>
+              <a:t>Percutaneous biopsy (gold standard)</a:t>
+            </a:r>
+          </a:p>
+          <a:p>
+            <a:pPr lvl="2"/>
+            <a:r>
+              <a:rPr lang="en-US" sz="1400" dirty="0"/>
+              <a:t>Invasive, expensive, poor patient acceptance, risk of complication (~3%)</a:t>
+            </a:r>
+          </a:p>
+          <a:p>
+            <a:pPr lvl="2"/>
+            <a:r>
+              <a:rPr lang="en-US" sz="1400" dirty="0"/>
+              <a:t>Samples prone to </a:t>
+            </a:r>
+            <a:r>
+              <a:rPr lang="en-US" sz="1400" dirty="0" smtClean="0"/>
+              <a:t>inter-observer </a:t>
+            </a:r>
+            <a:r>
+              <a:rPr lang="en-US" sz="1400" dirty="0"/>
+              <a:t>variability and poor repeatability</a:t>
+            </a:r>
+          </a:p>
+          <a:p>
+            <a:pPr lvl="1"/>
+            <a:r>
+              <a:rPr lang="en-US" sz="1800" dirty="0"/>
+              <a:t>Serum markers</a:t>
+            </a:r>
+          </a:p>
+          <a:p>
+            <a:pPr lvl="2"/>
+            <a:r>
+              <a:rPr lang="en-US" sz="1400" dirty="0"/>
+              <a:t>Variable accuracies</a:t>
+            </a:r>
+          </a:p>
+          <a:p>
+            <a:pPr lvl="1"/>
+            <a:r>
+              <a:rPr lang="en-US" sz="1800" dirty="0"/>
+              <a:t>Ultrasound Elastography (Fibroscan)</a:t>
+            </a:r>
+          </a:p>
+          <a:p>
+            <a:pPr lvl="2"/>
+            <a:r>
+              <a:rPr lang="en-US" sz="1400" dirty="0"/>
+              <a:t>Successful, but limited to localized spot measurements</a:t>
+            </a:r>
+          </a:p>
+          <a:p>
+            <a:pPr lvl="2"/>
+            <a:r>
+              <a:rPr lang="en-US" sz="1400" dirty="0"/>
+              <a:t>Obesity, ascites, bowel interposition may limit diagnostic accuracy</a:t>
+            </a:r>
+          </a:p>
+          <a:p>
+            <a:pPr lvl="1"/>
+            <a:r>
+              <a:rPr lang="en-US" sz="1800" dirty="0"/>
+              <a:t>MR Elastography</a:t>
+            </a:r>
+          </a:p>
+          <a:p>
+            <a:pPr lvl="2"/>
+            <a:r>
+              <a:rPr lang="en-US" sz="1400" dirty="0"/>
+              <a:t>Creates complete stiffness map of </a:t>
+            </a:r>
+            <a:r>
+              <a:rPr lang="en-US" sz="1400" dirty="0" smtClean="0"/>
+              <a:t>liver, more accurate than Fibroscan</a:t>
+            </a:r>
+            <a:r>
+              <a:rPr lang="en-US" sz="1800" baseline="30000" dirty="0" smtClean="0"/>
+              <a:t>1</a:t>
+            </a:r>
+            <a:endParaRPr lang="en-US" sz="1400" dirty="0" smtClean="0"/>
+          </a:p>
+          <a:p>
+            <a:pPr lvl="2"/>
+            <a:r>
+              <a:rPr lang="en-US" sz="1400" dirty="0" smtClean="0"/>
+              <a:t>Hepatic </a:t>
+            </a:r>
+            <a:r>
+              <a:rPr lang="en-US" sz="1400" dirty="0"/>
+              <a:t>iron overload, </a:t>
+            </a:r>
+            <a:r>
+              <a:rPr lang="en-US" sz="1400" dirty="0" smtClean="0"/>
+              <a:t>breath-hold </a:t>
+            </a:r>
+            <a:r>
+              <a:rPr lang="en-US" sz="1400" dirty="0"/>
+              <a:t>may limit diagnostic </a:t>
+            </a:r>
+            <a:r>
+              <a:rPr lang="en-US" sz="1400" dirty="0" smtClean="0"/>
+              <a:t>accuracy</a:t>
+            </a:r>
+          </a:p>
+          <a:p>
+            <a:pPr marL="914400" lvl="2" indent="0">
+              <a:buNone/>
+            </a:pPr>
+            <a:endParaRPr lang="en-US" dirty="0" smtClean="0"/>
+          </a:p>
+          <a:p>
+            <a:pPr lvl="2"/>
+            <a:endParaRPr lang="en-US" dirty="0"/>
+          </a:p>
+        </p:txBody>
+      </p:sp>
+      <p:sp>
+        <p:nvSpPr>
+          <p:cNvPr id="2" name="Title 1"/>
+          <p:cNvSpPr>
+            <a:spLocks noGrp="1"/>
+          </p:cNvSpPr>
+          <p:nvPr>
+            <p:ph type="title"/>
+          </p:nvPr>
+        </p:nvSpPr>
+        <p:spPr>
+          <a:xfrm>
+            <a:off x="436606" y="407773"/>
+            <a:ext cx="10972800" cy="506627"/>
+          </a:xfrm>
+        </p:spPr>
+        <p:txBody>
+          <a:bodyPr>
+            <a:noAutofit/>
+          </a:bodyPr>
+          <a:lstStyle/>
+          <a:p>
+            <a:r>
+              <a:rPr lang="en-US" sz="3200" dirty="0" smtClean="0"/>
+              <a:t>Liver Fibrosis</a:t>
+            </a:r>
+            <a:endParaRPr lang="en-US" sz="3200" dirty="0"/>
+          </a:p>
+        </p:txBody>
+      </p:sp>
+      <p:pic>
+        <p:nvPicPr>
+          <p:cNvPr id="4" name="Picture 3"/>
+          <p:cNvPicPr>
+            <a:picLocks noChangeAspect="1"/>
+          </p:cNvPicPr>
+          <p:nvPr/>
+        </p:nvPicPr>
+        <p:blipFill>
+          <a:blip r:embed="rId3"/>
+          <a:stretch>
+            <a:fillRect/>
+          </a:stretch>
+        </p:blipFill>
+        <p:spPr>
+          <a:xfrm>
+            <a:off x="7903040" y="2743200"/>
+            <a:ext cx="3506366" cy="2327075"/>
+          </a:xfrm>
+          <a:prstGeom prst="rect">
+            <a:avLst/>
+          </a:prstGeom>
+        </p:spPr>
+      </p:pic>
+      <p:sp>
+        <p:nvSpPr>
+          <p:cNvPr id="5" name="TextBox 4"/>
+          <p:cNvSpPr txBox="1"/>
+          <p:nvPr/>
+        </p:nvSpPr>
+        <p:spPr>
+          <a:xfrm>
+            <a:off x="7815891" y="5070275"/>
+            <a:ext cx="3797643" cy="261610"/>
+          </a:xfrm>
+          <a:prstGeom prst="rect">
+            <a:avLst/>
+          </a:prstGeom>
+          <a:noFill/>
+        </p:spPr>
+        <p:txBody>
+          <a:bodyPr wrap="square" rtlCol="0">
+            <a:spAutoFit/>
+          </a:bodyPr>
+          <a:lstStyle/>
+          <a:p>
+            <a:r>
+              <a:rPr lang="en-US" sz="1050" b="0" dirty="0"/>
+              <a:t>https://www.youtube.com/watch?reload=9&amp;v=TXxI4bB_CQY</a:t>
+            </a:r>
+          </a:p>
+        </p:txBody>
+      </p:sp>
+      <p:sp>
+        <p:nvSpPr>
+          <p:cNvPr id="6" name="TextBox 5"/>
+          <p:cNvSpPr txBox="1"/>
+          <p:nvPr/>
+        </p:nvSpPr>
+        <p:spPr>
+          <a:xfrm>
+            <a:off x="0" y="6312771"/>
+            <a:ext cx="8654759" cy="877163"/>
+          </a:xfrm>
+          <a:prstGeom prst="rect">
+            <a:avLst/>
+          </a:prstGeom>
+          <a:noFill/>
+        </p:spPr>
+        <p:txBody>
+          <a:bodyPr wrap="square" rtlCol="0">
+            <a:spAutoFit/>
+          </a:bodyPr>
+          <a:lstStyle/>
+          <a:p>
+            <a:r>
+              <a:rPr lang="en-US" sz="1200" b="0" dirty="0" smtClean="0"/>
+              <a:t>1. Xiao </a:t>
+            </a:r>
+            <a:r>
+              <a:rPr lang="en-US" sz="1200" b="0" dirty="0"/>
+              <a:t>H, Shi M, </a:t>
+            </a:r>
+            <a:r>
+              <a:rPr lang="en-US" sz="1200" b="0" dirty="0" err="1"/>
+              <a:t>Xie</a:t>
+            </a:r>
+            <a:r>
+              <a:rPr lang="en-US" sz="1200" b="0" dirty="0"/>
+              <a:t> Y, Chi X. Comparison of diagnostic accuracy of magnetic resonance </a:t>
+            </a:r>
+            <a:r>
+              <a:rPr lang="en-US" sz="1200" b="0" dirty="0" err="1"/>
+              <a:t>elastography</a:t>
+            </a:r>
+            <a:r>
+              <a:rPr lang="en-US" sz="1200" b="0" dirty="0"/>
+              <a:t> and Fibroscan for detecting liver fibrosis in chronic hepatitis B patients: A systematic review and meta-analysis. </a:t>
+            </a:r>
+            <a:r>
+              <a:rPr lang="en-US" sz="1200" b="0" dirty="0" err="1"/>
+              <a:t>PLoS</a:t>
+            </a:r>
+            <a:r>
+              <a:rPr lang="en-US" sz="1200" b="0" dirty="0"/>
+              <a:t> One 2017;12:1–14.</a:t>
+            </a:r>
+          </a:p>
+          <a:p>
+            <a:endParaRPr lang="en-US" dirty="0"/>
+          </a:p>
+        </p:txBody>
+      </p:sp>
+    </p:spTree>
+    <p:extLst>
+      <p:ext uri="{BB962C8B-B14F-4D97-AF65-F5344CB8AC3E}">
+        <p14:creationId xmlns:p14="http://schemas.microsoft.com/office/powerpoint/2010/main" val="1629895785"/>
+      </p:ext>
+    </p:extLst>
+  </p:cSld>
+  <p:clrMapOvr>
+    <a:masterClrMapping/>
+  </p:clrMapOvr>
+  <p:timing>
+    <p:tnLst>
+      <p:par>
+        <p:cTn id="1" dur="indefinite" restart="never" nodeType="tmRoot"/>
+      </p:par>
+    </p:tnLst>
+  </p:timing>
+</p:sld>
+</file>
+
+<file path=ppt/slides/slide5.xml><?xml version="1.0" encoding="utf-8"?>
+<p:sld xmlns:a="http://schemas.openxmlformats.org/drawingml/2006/main" xmlns:r="http://schemas.openxmlformats.org/officeDocument/2006/relationships" xmlns:p="http://schemas.openxmlformats.org/presentationml/2006/main">
+  <p:cSld>
+    <p:spTree>
+      <p:nvGrpSpPr>
+        <p:cNvPr id="1" name=""/>
+        <p:cNvGrpSpPr/>
+        <p:nvPr/>
+      </p:nvGrpSpPr>
+      <p:grpSpPr>
+        <a:xfrm>
+          <a:off x="0" y="0"/>
+          <a:ext cx="0" cy="0"/>
+          <a:chOff x="0" y="0"/>
+          <a:chExt cx="0" cy="0"/>
+        </a:xfrm>
+      </p:grpSpPr>
+      <p:sp>
+        <p:nvSpPr>
+          <p:cNvPr id="3" name="Content Placeholder 2"/>
+          <p:cNvSpPr>
+            <a:spLocks noGrp="1"/>
+          </p:cNvSpPr>
+          <p:nvPr>
+            <p:ph idx="1"/>
+          </p:nvPr>
+        </p:nvSpPr>
+        <p:spPr/>
+        <p:txBody>
+          <a:bodyPr/>
+          <a:lstStyle/>
+          <a:p>
+            <a:pPr lvl="1"/>
+            <a:r>
+              <a:rPr lang="en-US" dirty="0" smtClean="0"/>
+              <a:t>Transverse </a:t>
+            </a:r>
+            <a:r>
+              <a:rPr lang="en-US" dirty="0" smtClean="0"/>
+              <a:t>waves are introduced</a:t>
+            </a:r>
+            <a:r>
+              <a:rPr lang="en-US" dirty="0"/>
+              <a:t> </a:t>
+            </a:r>
+            <a:r>
+              <a:rPr lang="en-US" dirty="0" smtClean="0"/>
+              <a:t>by driver (20-200Hz</a:t>
+            </a:r>
+            <a:r>
+              <a:rPr lang="en-US" dirty="0" smtClean="0"/>
+              <a:t>)</a:t>
+            </a:r>
+          </a:p>
+          <a:p>
+            <a:pPr lvl="2"/>
+            <a:r>
+              <a:rPr lang="en-US" dirty="0" smtClean="0"/>
+              <a:t>Active pneumatic driver placed outside of MR room</a:t>
+            </a:r>
+          </a:p>
+          <a:p>
+            <a:pPr lvl="2"/>
+            <a:r>
+              <a:rPr lang="en-US" dirty="0" smtClean="0"/>
+              <a:t>Passive driver placed on patient</a:t>
+            </a:r>
+          </a:p>
+          <a:p>
+            <a:pPr lvl="1"/>
+            <a:r>
+              <a:rPr lang="en-US" dirty="0" smtClean="0"/>
+              <a:t>Shear waves (longitudinal) are produced </a:t>
+            </a:r>
+          </a:p>
+          <a:p>
+            <a:pPr lvl="1"/>
+            <a:r>
+              <a:rPr lang="en-US" dirty="0" smtClean="0"/>
+              <a:t>Wavelength </a:t>
+            </a:r>
+            <a:r>
+              <a:rPr lang="en-US" dirty="0" smtClean="0"/>
+              <a:t>dependent on </a:t>
+            </a:r>
+            <a:r>
+              <a:rPr lang="en-US" dirty="0" smtClean="0"/>
+              <a:t>shear </a:t>
+            </a:r>
+            <a:r>
+              <a:rPr lang="en-US" dirty="0" smtClean="0"/>
+              <a:t>modulus</a:t>
+            </a:r>
+          </a:p>
+          <a:p>
+            <a:pPr lvl="2"/>
+            <a:r>
+              <a:rPr lang="en-US" dirty="0" smtClean="0"/>
+              <a:t>Waves propagate rapidly in stiff tissue, slower in softer </a:t>
+            </a:r>
+            <a:r>
+              <a:rPr lang="en-US" dirty="0" smtClean="0"/>
+              <a:t>tissue</a:t>
+            </a:r>
+            <a:endParaRPr lang="en-US" dirty="0" smtClean="0"/>
+          </a:p>
+          <a:p>
+            <a:pPr lvl="2"/>
+            <a:endParaRPr lang="en-US" dirty="0" smtClean="0"/>
+          </a:p>
+          <a:p>
+            <a:pPr lvl="1"/>
+            <a:endParaRPr lang="en-US" dirty="0" smtClean="0"/>
+          </a:p>
+          <a:p>
+            <a:pPr lvl="2"/>
+            <a:endParaRPr lang="en-US" dirty="0" smtClean="0"/>
+          </a:p>
+          <a:p>
+            <a:pPr lvl="1"/>
+            <a:endParaRPr lang="en-US" dirty="0" smtClean="0"/>
+          </a:p>
+        </p:txBody>
+      </p:sp>
+      <p:sp>
+        <p:nvSpPr>
+          <p:cNvPr id="2" name="Title 1"/>
+          <p:cNvSpPr>
+            <a:spLocks noGrp="1"/>
+          </p:cNvSpPr>
+          <p:nvPr>
+            <p:ph type="title"/>
+          </p:nvPr>
+        </p:nvSpPr>
+        <p:spPr>
+          <a:xfrm>
+            <a:off x="436606" y="407773"/>
+            <a:ext cx="10972800" cy="506627"/>
+          </a:xfrm>
+        </p:spPr>
+        <p:txBody>
+          <a:bodyPr>
+            <a:noAutofit/>
+          </a:bodyPr>
+          <a:lstStyle/>
+          <a:p>
+            <a:r>
+              <a:rPr lang="en-US" sz="3200" dirty="0" smtClean="0"/>
+              <a:t>Basic Principles of MRE</a:t>
+            </a:r>
+            <a:endParaRPr lang="en-US" sz="3200" dirty="0"/>
+          </a:p>
+        </p:txBody>
+      </p:sp>
+      <p:pic>
+        <p:nvPicPr>
+          <p:cNvPr id="4" name="Picture 3"/>
+          <p:cNvPicPr>
+            <a:picLocks noChangeAspect="1"/>
+          </p:cNvPicPr>
+          <p:nvPr/>
+        </p:nvPicPr>
+        <p:blipFill>
+          <a:blip r:embed="rId2"/>
+          <a:stretch>
+            <a:fillRect/>
+          </a:stretch>
+        </p:blipFill>
+        <p:spPr>
+          <a:xfrm>
+            <a:off x="4646141" y="4056446"/>
+            <a:ext cx="3480098" cy="2410851"/>
+          </a:xfrm>
+          <a:prstGeom prst="rect">
+            <a:avLst/>
+          </a:prstGeom>
+        </p:spPr>
+      </p:pic>
+      <p:pic>
+        <p:nvPicPr>
+          <p:cNvPr id="5" name="Picture 4"/>
+          <p:cNvPicPr>
+            <a:picLocks noChangeAspect="1"/>
+          </p:cNvPicPr>
+          <p:nvPr/>
+        </p:nvPicPr>
+        <p:blipFill>
+          <a:blip r:embed="rId3"/>
+          <a:stretch>
+            <a:fillRect/>
+          </a:stretch>
+        </p:blipFill>
+        <p:spPr>
+          <a:xfrm>
+            <a:off x="1107690" y="4124525"/>
+            <a:ext cx="2784988" cy="2274695"/>
+          </a:xfrm>
+          <a:prstGeom prst="rect">
+            <a:avLst/>
+          </a:prstGeom>
+        </p:spPr>
+      </p:pic>
+    </p:spTree>
+    <p:extLst>
+      <p:ext uri="{BB962C8B-B14F-4D97-AF65-F5344CB8AC3E}">
+        <p14:creationId xmlns:p14="http://schemas.microsoft.com/office/powerpoint/2010/main" val="2891696569"/>
+      </p:ext>
+    </p:extLst>
+  </p:cSld>
+  <p:clrMapOvr>
+    <a:masterClrMapping/>
+  </p:clrMapOvr>
+  <p:timing>
+    <p:tnLst>
+      <p:par>
+        <p:cTn id="1" dur="indefinite" restart="never" nodeType="tmRoot"/>
+      </p:par>
+    </p:tnLst>
+  </p:timing>
+</p:sld>
+</file>
+
+<file path=ppt/slides/slide6.xml><?xml version="1.0" encoding="utf-8"?>
+<p:sld xmlns:a="http://schemas.openxmlformats.org/drawingml/2006/main" xmlns:r="http://schemas.openxmlformats.org/officeDocument/2006/relationships" xmlns:p="http://schemas.openxmlformats.org/presentationml/2006/main">
+  <p:cSld>
+    <p:spTree>
+      <p:nvGrpSpPr>
+        <p:cNvPr id="1" name=""/>
+        <p:cNvGrpSpPr/>
+        <p:nvPr/>
+      </p:nvGrpSpPr>
+      <p:grpSpPr>
+        <a:xfrm>
+          <a:off x="0" y="0"/>
+          <a:ext cx="0" cy="0"/>
+          <a:chOff x="0" y="0"/>
+          <a:chExt cx="0" cy="0"/>
+        </a:xfrm>
+      </p:grpSpPr>
+      <p:sp>
+        <p:nvSpPr>
+          <p:cNvPr id="3" name="Content Placeholder 2"/>
+          <p:cNvSpPr>
+            <a:spLocks noGrp="1"/>
+          </p:cNvSpPr>
+          <p:nvPr>
+            <p:ph idx="1"/>
+          </p:nvPr>
+        </p:nvSpPr>
+        <p:spPr/>
+        <p:txBody>
+          <a:bodyPr/>
+          <a:lstStyle/>
+          <a:p>
+            <a:r>
+              <a:rPr lang="en-US" dirty="0" smtClean="0"/>
+              <a:t>Modified phase-contrast sequence</a:t>
+            </a:r>
+          </a:p>
+          <a:p>
+            <a:pPr lvl="1"/>
+            <a:r>
+              <a:rPr lang="en-US" dirty="0" smtClean="0"/>
+              <a:t>Sensitized motion to cyclic displacement from shear waves</a:t>
+            </a:r>
+          </a:p>
+          <a:p>
+            <a:pPr lvl="2"/>
+            <a:r>
+              <a:rPr lang="en-US" dirty="0" smtClean="0"/>
+              <a:t>Displacements on the order of microns</a:t>
+            </a:r>
+          </a:p>
+          <a:p>
+            <a:pPr lvl="2"/>
+            <a:r>
+              <a:rPr lang="en-US" dirty="0" smtClean="0"/>
+              <a:t>Spins accumulate </a:t>
+            </a:r>
+            <a:r>
+              <a:rPr lang="en-US" dirty="0"/>
+              <a:t>phase along bipolar or 1</a:t>
+            </a:r>
+            <a:r>
+              <a:rPr lang="en-US" baseline="30000" dirty="0"/>
+              <a:t>st</a:t>
+            </a:r>
+            <a:r>
+              <a:rPr lang="en-US" dirty="0"/>
+              <a:t> order </a:t>
+            </a:r>
+            <a:r>
+              <a:rPr lang="en-US" dirty="0" smtClean="0"/>
+              <a:t>gradient</a:t>
+            </a:r>
+          </a:p>
+          <a:p>
+            <a:pPr lvl="1"/>
+            <a:r>
+              <a:rPr lang="en-US" dirty="0" smtClean="0"/>
+              <a:t>Motion encoding gradients (MEG)</a:t>
+            </a:r>
+          </a:p>
+          <a:p>
+            <a:pPr lvl="2"/>
+            <a:r>
+              <a:rPr lang="en-US" dirty="0"/>
+              <a:t>S</a:t>
+            </a:r>
+            <a:r>
+              <a:rPr lang="en-US" dirty="0" smtClean="0"/>
+              <a:t>ynchronized to driver frequency</a:t>
+            </a:r>
+          </a:p>
+          <a:p>
+            <a:pPr lvl="2"/>
+            <a:r>
+              <a:rPr lang="en-US" dirty="0" smtClean="0"/>
+              <a:t>Can be placed in any dimension (</a:t>
+            </a:r>
+            <a:r>
+              <a:rPr lang="en-US" dirty="0" err="1" smtClean="0"/>
+              <a:t>x,y,z</a:t>
+            </a:r>
+            <a:r>
+              <a:rPr lang="en-US" dirty="0" smtClean="0"/>
+              <a:t>)</a:t>
+            </a:r>
+          </a:p>
+          <a:p>
+            <a:endParaRPr lang="en-US" dirty="0"/>
+          </a:p>
+        </p:txBody>
+      </p:sp>
+      <p:sp>
+        <p:nvSpPr>
+          <p:cNvPr id="2" name="Title 1"/>
+          <p:cNvSpPr>
+            <a:spLocks noGrp="1"/>
+          </p:cNvSpPr>
+          <p:nvPr>
+            <p:ph type="title"/>
+          </p:nvPr>
+        </p:nvSpPr>
+        <p:spPr>
+          <a:xfrm>
+            <a:off x="436606" y="407773"/>
+            <a:ext cx="10972800" cy="506627"/>
+          </a:xfrm>
+        </p:spPr>
+        <p:txBody>
+          <a:bodyPr>
+            <a:noAutofit/>
+          </a:bodyPr>
+          <a:lstStyle/>
+          <a:p>
+            <a:r>
+              <a:rPr lang="en-US" sz="3200" dirty="0" smtClean="0"/>
+              <a:t>Basic Principles of MRE</a:t>
+            </a:r>
+            <a:endParaRPr lang="en-US" sz="3200" dirty="0"/>
+          </a:p>
+        </p:txBody>
+      </p:sp>
+      <p:sp>
+        <p:nvSpPr>
+          <p:cNvPr id="5" name="Rectangle 4"/>
+          <p:cNvSpPr/>
+          <p:nvPr/>
+        </p:nvSpPr>
+        <p:spPr>
+          <a:xfrm>
+            <a:off x="1729945" y="6248196"/>
+            <a:ext cx="4794422" cy="487569"/>
+          </a:xfrm>
+          <a:prstGeom prst="rect">
+            <a:avLst/>
+          </a:prstGeom>
+        </p:spPr>
+        <p:txBody>
+          <a:bodyPr wrap="square">
+            <a:spAutoFit/>
+          </a:bodyPr>
+          <a:lstStyle/>
+          <a:p>
+            <a:pPr marL="0" marR="0">
+              <a:lnSpc>
+                <a:spcPct val="107000"/>
+              </a:lnSpc>
+              <a:spcBef>
+                <a:spcPts val="0"/>
+              </a:spcBef>
+              <a:spcAft>
+                <a:spcPts val="800"/>
+              </a:spcAft>
+            </a:pPr>
+            <a:r>
+              <a:rPr lang="en-US" sz="1200" b="0" dirty="0" err="1" smtClean="0">
+                <a:latin typeface="Calibri" panose="020F0502020204030204" pitchFamily="34" charset="0"/>
+                <a:ea typeface="Calibri" panose="020F0502020204030204" pitchFamily="34" charset="0"/>
+                <a:cs typeface="Calibri" panose="020F0502020204030204" pitchFamily="34" charset="0"/>
+              </a:rPr>
+              <a:t>Venkatesh</a:t>
+            </a:r>
+            <a:r>
+              <a:rPr lang="en-US" sz="1200" b="0" dirty="0" smtClean="0">
+                <a:latin typeface="Calibri" panose="020F0502020204030204" pitchFamily="34" charset="0"/>
+                <a:ea typeface="Calibri" panose="020F0502020204030204" pitchFamily="34" charset="0"/>
+                <a:cs typeface="Calibri" panose="020F0502020204030204" pitchFamily="34" charset="0"/>
+              </a:rPr>
+              <a:t> </a:t>
+            </a:r>
+            <a:r>
+              <a:rPr lang="en-US" sz="1200" b="0" dirty="0">
+                <a:latin typeface="Calibri" panose="020F0502020204030204" pitchFamily="34" charset="0"/>
+                <a:ea typeface="Calibri" panose="020F0502020204030204" pitchFamily="34" charset="0"/>
+                <a:cs typeface="Calibri" panose="020F0502020204030204" pitchFamily="34" charset="0"/>
+              </a:rPr>
+              <a:t>SK, Yin M, </a:t>
+            </a:r>
+            <a:r>
+              <a:rPr lang="en-US" sz="1200" b="0" dirty="0" err="1">
+                <a:latin typeface="Calibri" panose="020F0502020204030204" pitchFamily="34" charset="0"/>
+                <a:ea typeface="Calibri" panose="020F0502020204030204" pitchFamily="34" charset="0"/>
+                <a:cs typeface="Calibri" panose="020F0502020204030204" pitchFamily="34" charset="0"/>
+              </a:rPr>
+              <a:t>Ehman</a:t>
+            </a:r>
+            <a:r>
+              <a:rPr lang="en-US" sz="1200" b="0" dirty="0">
+                <a:latin typeface="Calibri" panose="020F0502020204030204" pitchFamily="34" charset="0"/>
+                <a:ea typeface="Calibri" panose="020F0502020204030204" pitchFamily="34" charset="0"/>
+                <a:cs typeface="Calibri" panose="020F0502020204030204" pitchFamily="34" charset="0"/>
+              </a:rPr>
+              <a:t> RL. Magnetic Resonance Elastography of Liver: Technique, Analysis, and Clinical Applications. 2013;37:544–555</a:t>
+            </a:r>
+            <a:r>
+              <a:rPr lang="en-US" sz="1200" dirty="0">
+                <a:latin typeface="Calibri" panose="020F0502020204030204" pitchFamily="34" charset="0"/>
+                <a:ea typeface="Calibri" panose="020F0502020204030204" pitchFamily="34" charset="0"/>
+                <a:cs typeface="Calibri" panose="020F0502020204030204" pitchFamily="34" charset="0"/>
+              </a:rPr>
+              <a:t>.</a:t>
+            </a:r>
+            <a:endParaRPr lang="en-US" sz="1200" dirty="0">
+              <a:effectLst/>
+              <a:latin typeface="Calibri" panose="020F0502020204030204" pitchFamily="34" charset="0"/>
+              <a:ea typeface="Calibri" panose="020F0502020204030204" pitchFamily="34" charset="0"/>
+              <a:cs typeface="Times New Roman" panose="02020603050405020304" pitchFamily="18" charset="0"/>
+            </a:endParaRPr>
+          </a:p>
+        </p:txBody>
+      </p:sp>
+      <p:pic>
+        <p:nvPicPr>
+          <p:cNvPr id="7" name="Picture 6"/>
+          <p:cNvPicPr>
+            <a:picLocks noChangeAspect="1"/>
+          </p:cNvPicPr>
+          <p:nvPr/>
+        </p:nvPicPr>
+        <p:blipFill>
+          <a:blip r:embed="rId2">
+            <a:extLst>
+              <a:ext uri="{28A0092B-C50C-407E-A947-70E740481C1C}">
+                <a14:useLocalDpi xmlns:a14="http://schemas.microsoft.com/office/drawing/2010/main" val="0"/>
+              </a:ext>
+            </a:extLst>
+          </a:blip>
+          <a:stretch>
+            <a:fillRect/>
+          </a:stretch>
+        </p:blipFill>
+        <p:spPr>
+          <a:xfrm>
+            <a:off x="7318051" y="3419906"/>
+            <a:ext cx="3745364" cy="1514560"/>
+          </a:xfrm>
+          <a:prstGeom prst="rect">
+            <a:avLst/>
+          </a:prstGeom>
+        </p:spPr>
+      </p:pic>
+    </p:spTree>
+    <p:extLst>
+      <p:ext uri="{BB962C8B-B14F-4D97-AF65-F5344CB8AC3E}">
+        <p14:creationId xmlns:p14="http://schemas.microsoft.com/office/powerpoint/2010/main" val="3059598749"/>
+      </p:ext>
+    </p:extLst>
+  </p:cSld>
+  <p:clrMapOvr>
+    <a:masterClrMapping/>
+  </p:clrMapOvr>
+  <p:timing>
+    <p:tnLst>
+      <p:par>
+        <p:cTn id="1" dur="indefinite" restart="never" nodeType="tmRoot"/>
+      </p:par>
+    </p:tnLst>
+  </p:timing>
+</p:sld>
+</file>
+
+<file path=ppt/slides/slide7.xml><?xml version="1.0" encoding="utf-8"?>
+<p:sld xmlns:a="http://schemas.openxmlformats.org/drawingml/2006/main" xmlns:r="http://schemas.openxmlformats.org/officeDocument/2006/relationships" xmlns:p="http://schemas.openxmlformats.org/presentationml/2006/main">
+  <p:cSld>
+    <p:spTree>
+      <p:nvGrpSpPr>
+        <p:cNvPr id="1" name=""/>
+        <p:cNvGrpSpPr/>
+        <p:nvPr/>
+      </p:nvGrpSpPr>
+      <p:grpSpPr>
+        <a:xfrm>
+          <a:off x="0" y="0"/>
+          <a:ext cx="0" cy="0"/>
+          <a:chOff x="0" y="0"/>
+          <a:chExt cx="0" cy="0"/>
+        </a:xfrm>
+      </p:grpSpPr>
+      <p:sp>
+        <p:nvSpPr>
+          <p:cNvPr id="2" name="Content Placeholder 1"/>
+          <p:cNvSpPr>
+            <a:spLocks noGrp="1"/>
+          </p:cNvSpPr>
+          <p:nvPr>
+            <p:ph idx="1"/>
+          </p:nvPr>
+        </p:nvSpPr>
+        <p:spPr/>
+        <p:txBody>
+          <a:bodyPr/>
+          <a:lstStyle/>
+          <a:p>
+            <a:pPr marL="0" indent="0">
+              <a:buNone/>
+            </a:pPr>
+            <a:r>
+              <a:rPr lang="en-US" sz="2800" u="sng" dirty="0"/>
+              <a:t>Basic Liver </a:t>
+            </a:r>
+            <a:r>
+              <a:rPr lang="en-US" sz="2800" u="sng" dirty="0" smtClean="0"/>
+              <a:t>Sequence</a:t>
+            </a:r>
+            <a:endParaRPr lang="en-US" dirty="0" smtClean="0"/>
+          </a:p>
+          <a:p>
+            <a:r>
+              <a:rPr lang="en-US" dirty="0" smtClean="0"/>
+              <a:t>Short TR (50ms), short TE (20ms), </a:t>
+            </a:r>
+            <a:r>
+              <a:rPr lang="en-US" dirty="0"/>
+              <a:t>and low flip </a:t>
+            </a:r>
+            <a:r>
+              <a:rPr lang="en-US" dirty="0" smtClean="0"/>
+              <a:t>angle (&lt;30˚)</a:t>
+            </a:r>
+          </a:p>
+          <a:p>
+            <a:r>
+              <a:rPr lang="en-US" dirty="0" smtClean="0"/>
+              <a:t>Requires less than a minute of acquisition time</a:t>
+            </a:r>
+          </a:p>
+          <a:p>
+            <a:pPr lvl="1"/>
+            <a:r>
+              <a:rPr lang="en-US" dirty="0" smtClean="0"/>
+              <a:t>Uses </a:t>
+            </a:r>
+            <a:r>
+              <a:rPr lang="en-US" dirty="0"/>
+              <a:t>fast sequences (EPI, GRE, or FSE)</a:t>
+            </a:r>
+          </a:p>
+          <a:p>
+            <a:pPr lvl="1"/>
+            <a:r>
+              <a:rPr lang="en-US" dirty="0"/>
+              <a:t>Only acquires 2-4 </a:t>
+            </a:r>
+            <a:r>
+              <a:rPr lang="en-US" dirty="0" smtClean="0"/>
+              <a:t>slices</a:t>
+            </a:r>
+          </a:p>
+          <a:p>
+            <a:r>
+              <a:rPr lang="en-US" dirty="0" smtClean="0"/>
+              <a:t>Parallel imaging (x2)</a:t>
+            </a:r>
+          </a:p>
+          <a:p>
+            <a:r>
+              <a:rPr lang="en-US" dirty="0" smtClean="0"/>
+              <a:t>256 x 64 matrix</a:t>
+            </a:r>
+          </a:p>
+          <a:p>
+            <a:r>
+              <a:rPr lang="en-US" dirty="0" smtClean="0"/>
+              <a:t>Phase offsets = 4</a:t>
+            </a:r>
+          </a:p>
+          <a:p>
+            <a:r>
+              <a:rPr lang="en-US" dirty="0" smtClean="0"/>
+              <a:t>Breath-hold (15 s)</a:t>
+            </a:r>
+          </a:p>
+          <a:p>
+            <a:endParaRPr lang="en-US" dirty="0" smtClean="0"/>
+          </a:p>
+          <a:p>
+            <a:endParaRPr lang="en-US" dirty="0" smtClean="0"/>
+          </a:p>
+          <a:p>
+            <a:endParaRPr lang="en-US" dirty="0" smtClean="0"/>
+          </a:p>
+          <a:p>
+            <a:endParaRPr lang="en-US" dirty="0" smtClean="0"/>
+          </a:p>
+          <a:p>
+            <a:endParaRPr lang="en-US" dirty="0"/>
+          </a:p>
+          <a:p>
+            <a:endParaRPr lang="en-US" dirty="0"/>
+          </a:p>
+        </p:txBody>
+      </p:sp>
+      <p:sp>
+        <p:nvSpPr>
+          <p:cNvPr id="5" name="Title 1"/>
+          <p:cNvSpPr txBox="1">
+            <a:spLocks/>
+          </p:cNvSpPr>
+          <p:nvPr/>
+        </p:nvSpPr>
+        <p:spPr>
+          <a:xfrm>
+            <a:off x="436606" y="407773"/>
+            <a:ext cx="10972800" cy="506627"/>
+          </a:xfrm>
+          <a:prstGeom prst="rect">
+            <a:avLst/>
+          </a:prstGeom>
+        </p:spPr>
+        <p:txBody>
+          <a:bodyPr vert="horz" lIns="91440" tIns="45720" rIns="91440" bIns="45720" rtlCol="0" anchor="t">
+            <a:noAutofit/>
+          </a:bodyPr>
+          <a:lstStyle>
+            <a:lvl1pPr algn="l" rtl="0" eaLnBrk="1" fontAlgn="base" hangingPunct="1">
+              <a:lnSpc>
+                <a:spcPct val="90000"/>
+              </a:lnSpc>
+              <a:spcBef>
+                <a:spcPct val="0"/>
+              </a:spcBef>
+              <a:spcAft>
+                <a:spcPct val="0"/>
+              </a:spcAft>
+              <a:defRPr sz="3000">
+                <a:solidFill>
+                  <a:schemeClr val="bg1"/>
+                </a:solidFill>
+                <a:latin typeface="+mj-lt"/>
+                <a:ea typeface="+mj-ea"/>
+                <a:cs typeface="+mj-cs"/>
+              </a:defRPr>
+            </a:lvl1pPr>
+            <a:lvl2pPr algn="ctr" rtl="0" eaLnBrk="1" fontAlgn="base" hangingPunct="1">
+              <a:spcBef>
+                <a:spcPct val="0"/>
+              </a:spcBef>
+              <a:spcAft>
+                <a:spcPct val="0"/>
+              </a:spcAft>
+              <a:defRPr sz="4400">
+                <a:solidFill>
+                  <a:schemeClr val="tx2"/>
+                </a:solidFill>
+                <a:latin typeface="Arial" charset="0"/>
+              </a:defRPr>
+            </a:lvl2pPr>
+            <a:lvl3pPr algn="ctr" rtl="0" eaLnBrk="1" fontAlgn="base" hangingPunct="1">
+              <a:spcBef>
+                <a:spcPct val="0"/>
+              </a:spcBef>
+              <a:spcAft>
+                <a:spcPct val="0"/>
+              </a:spcAft>
+              <a:defRPr sz="4400">
+                <a:solidFill>
+                  <a:schemeClr val="tx2"/>
+                </a:solidFill>
+                <a:latin typeface="Arial" charset="0"/>
+              </a:defRPr>
+            </a:lvl3pPr>
+            <a:lvl4pPr algn="ctr" rtl="0" eaLnBrk="1" fontAlgn="base" hangingPunct="1">
+              <a:spcBef>
+                <a:spcPct val="0"/>
+              </a:spcBef>
+              <a:spcAft>
+                <a:spcPct val="0"/>
+              </a:spcAft>
+              <a:defRPr sz="4400">
+                <a:solidFill>
+                  <a:schemeClr val="tx2"/>
+                </a:solidFill>
+                <a:latin typeface="Arial" charset="0"/>
+              </a:defRPr>
+            </a:lvl4pPr>
+            <a:lvl5pPr algn="ctr" rtl="0" eaLnBrk="1" fontAlgn="base" hangingPunct="1">
+              <a:spcBef>
+                <a:spcPct val="0"/>
+              </a:spcBef>
+              <a:spcAft>
+                <a:spcPct val="0"/>
+              </a:spcAft>
+              <a:defRPr sz="4400">
+                <a:solidFill>
+                  <a:schemeClr val="tx2"/>
+                </a:solidFill>
+                <a:latin typeface="Arial" charset="0"/>
+              </a:defRPr>
+            </a:lvl5pPr>
+            <a:lvl6pPr marL="457200" algn="ctr" rtl="0" eaLnBrk="1" fontAlgn="base" hangingPunct="1">
+              <a:spcBef>
+                <a:spcPct val="0"/>
+              </a:spcBef>
+              <a:spcAft>
+                <a:spcPct val="0"/>
+              </a:spcAft>
+              <a:defRPr sz="4400">
+                <a:solidFill>
+                  <a:schemeClr val="tx2"/>
+                </a:solidFill>
+                <a:latin typeface="Arial" charset="0"/>
+              </a:defRPr>
+            </a:lvl6pPr>
+            <a:lvl7pPr marL="914400" algn="ctr" rtl="0" eaLnBrk="1" fontAlgn="base" hangingPunct="1">
+              <a:spcBef>
+                <a:spcPct val="0"/>
+              </a:spcBef>
+              <a:spcAft>
+                <a:spcPct val="0"/>
+              </a:spcAft>
+              <a:defRPr sz="4400">
+                <a:solidFill>
+                  <a:schemeClr val="tx2"/>
+                </a:solidFill>
+                <a:latin typeface="Arial" charset="0"/>
+              </a:defRPr>
+            </a:lvl7pPr>
+            <a:lvl8pPr marL="1371600" algn="ctr" rtl="0" eaLnBrk="1" fontAlgn="base" hangingPunct="1">
+              <a:spcBef>
+                <a:spcPct val="0"/>
+              </a:spcBef>
+              <a:spcAft>
+                <a:spcPct val="0"/>
+              </a:spcAft>
+              <a:defRPr sz="4400">
+                <a:solidFill>
+                  <a:schemeClr val="tx2"/>
+                </a:solidFill>
+                <a:latin typeface="Arial" charset="0"/>
+              </a:defRPr>
+            </a:lvl8pPr>
+            <a:lvl9pPr marL="1828800" algn="ctr" rtl="0" eaLnBrk="1" fontAlgn="base" hangingPunct="1">
+              <a:spcBef>
+                <a:spcPct val="0"/>
+              </a:spcBef>
+              <a:spcAft>
+                <a:spcPct val="0"/>
+              </a:spcAft>
+              <a:defRPr sz="4400">
+                <a:solidFill>
+                  <a:schemeClr val="tx2"/>
+                </a:solidFill>
+                <a:latin typeface="Arial" charset="0"/>
+              </a:defRPr>
+            </a:lvl9pPr>
+          </a:lstStyle>
+          <a:p>
+            <a:r>
+              <a:rPr lang="en-US" sz="3200" b="0" kern="0" dirty="0" smtClean="0"/>
+              <a:t>Basic Principles of MRE</a:t>
+            </a:r>
+            <a:endParaRPr lang="en-US" sz="3200" b="0" kern="0" dirty="0"/>
+          </a:p>
+        </p:txBody>
+      </p:sp>
+      <p:pic>
+        <p:nvPicPr>
+          <p:cNvPr id="9" name="Picture 8"/>
+          <p:cNvPicPr>
+            <a:picLocks noChangeAspect="1"/>
+          </p:cNvPicPr>
+          <p:nvPr/>
+        </p:nvPicPr>
+        <p:blipFill>
+          <a:blip r:embed="rId2"/>
+          <a:stretch>
+            <a:fillRect/>
+          </a:stretch>
+        </p:blipFill>
+        <p:spPr>
+          <a:xfrm>
+            <a:off x="7647969" y="3041170"/>
+            <a:ext cx="3860290" cy="2791219"/>
+          </a:xfrm>
+          <a:prstGeom prst="rect">
+            <a:avLst/>
+          </a:prstGeom>
+        </p:spPr>
+      </p:pic>
+    </p:spTree>
+    <p:extLst>
+      <p:ext uri="{BB962C8B-B14F-4D97-AF65-F5344CB8AC3E}">
+        <p14:creationId xmlns:p14="http://schemas.microsoft.com/office/powerpoint/2010/main" val="4007077365"/>
+      </p:ext>
+    </p:extLst>
+  </p:cSld>
+  <p:clrMapOvr>
+    <a:masterClrMapping/>
+  </p:clrMapOvr>
+  <p:timing>
+    <p:tnLst>
+      <p:par>
+        <p:cTn id="1" dur="indefinite" restart="never" nodeType="tmRoot"/>
+      </p:par>
+    </p:tnLst>
+  </p:timing>
+</p:sld>
+</file>
+
+<file path=ppt/slides/slide8.xml><?xml version="1.0" encoding="utf-8"?>
 <p:sld xmlns:a="http://schemas.openxmlformats.org/drawingml/2006/main" xmlns:r="http://schemas.openxmlformats.org/officeDocument/2006/relationships" xmlns:p="http://schemas.openxmlformats.org/presentationml/2006/main">
   <p:cSld>
     <p:spTree>
@@ -41792,7 +44655,7 @@
           <a:p>
             <a:r>
               <a:rPr lang="en-US" sz="3200" dirty="0" smtClean="0"/>
-              <a:t>Introduction</a:t>
+              <a:t>Basic Principles of MRE</a:t>
             </a:r>
             <a:endParaRPr lang="en-US" sz="3200" dirty="0"/>
           </a:p>
@@ -41949,7 +44812,7 @@
 </p:sld>
 </file>
 
-<file path=ppt/slides/slide5.xml><?xml version="1.0" encoding="utf-8"?>
+<file path=ppt/slides/slide9.xml><?xml version="1.0" encoding="utf-8"?>
 <p:sld xmlns:a="http://schemas.openxmlformats.org/drawingml/2006/main" xmlns:r="http://schemas.openxmlformats.org/officeDocument/2006/relationships" xmlns:p="http://schemas.openxmlformats.org/presentationml/2006/main">
   <p:cSld>
     <p:spTree>
@@ -41990,7 +44853,7 @@
           <a:p>
             <a:r>
               <a:rPr lang="en-US" sz="3200" dirty="0" smtClean="0"/>
-              <a:t>Introduction</a:t>
+              <a:t>Post-processing </a:t>
             </a:r>
             <a:endParaRPr lang="en-US" sz="3200" dirty="0"/>
           </a:p>
@@ -42006,15 +44869,323 @@
             <p:ph idx="1"/>
           </p:nvPr>
         </p:nvSpPr>
-        <p:spPr/>
+        <p:spPr>
+          <a:xfrm>
+            <a:off x="510746" y="1482812"/>
+            <a:ext cx="10972800" cy="5041556"/>
+          </a:xfrm>
+        </p:spPr>
         <p:txBody>
           <a:bodyPr/>
           <a:lstStyle/>
           <a:p>
-            <a:endParaRPr lang="en-US"/>
-          </a:p>
-        </p:txBody>
-      </p:sp>
+            <a:r>
+              <a:rPr lang="en-US" sz="2400" dirty="0" smtClean="0"/>
+              <a:t>How do we obtain pressure information from wave images?</a:t>
+            </a:r>
+          </a:p>
+          <a:p>
+            <a:endParaRPr lang="en-US" dirty="0"/>
+          </a:p>
+          <a:p>
+            <a:endParaRPr lang="en-US" dirty="0" smtClean="0"/>
+          </a:p>
+          <a:p>
+            <a:endParaRPr lang="en-US" dirty="0"/>
+          </a:p>
+          <a:p>
+            <a:endParaRPr lang="en-US" dirty="0" smtClean="0"/>
+          </a:p>
+          <a:p>
+            <a:endParaRPr lang="en-US" dirty="0" smtClean="0"/>
+          </a:p>
+          <a:p>
+            <a:endParaRPr lang="en-US" sz="1400" dirty="0" smtClean="0"/>
+          </a:p>
+          <a:p>
+            <a:r>
+              <a:rPr lang="en-US" sz="2000" dirty="0" smtClean="0"/>
+              <a:t>Local frequency estimation</a:t>
+            </a:r>
+          </a:p>
+          <a:p>
+            <a:r>
+              <a:rPr lang="en-US" sz="2000" dirty="0"/>
+              <a:t>I</a:t>
+            </a:r>
+            <a:r>
+              <a:rPr lang="en-US" sz="2000" dirty="0" smtClean="0"/>
+              <a:t>nversion algorithm utilizing equations of motion to solve for shear modulus</a:t>
+            </a:r>
+          </a:p>
+          <a:p>
+            <a:pPr lvl="1"/>
+            <a:r>
+              <a:rPr lang="en-US" sz="1800" dirty="0" smtClean="0"/>
+              <a:t>Without assumptions</a:t>
+            </a:r>
+          </a:p>
+          <a:p>
+            <a:pPr lvl="2"/>
+            <a:r>
+              <a:rPr lang="en-US" sz="1600" dirty="0" smtClean="0"/>
+              <a:t>Inversion matrix = rank-4 tensor with 21 independent complex quantities</a:t>
+            </a:r>
+            <a:endParaRPr lang="en-US" sz="1600" dirty="0" smtClean="0"/>
+          </a:p>
+          <a:p>
+            <a:pPr lvl="1"/>
+            <a:r>
+              <a:rPr lang="en-US" sz="1800" dirty="0" smtClean="0"/>
+              <a:t>Simplifying assumptions = incompressible, isotropic</a:t>
+            </a:r>
+          </a:p>
+          <a:p>
+            <a:pPr lvl="2"/>
+            <a:r>
+              <a:rPr lang="en-US" sz="1600" dirty="0" smtClean="0"/>
+              <a:t>Inversion </a:t>
+            </a:r>
+            <a:r>
+              <a:rPr lang="en-US" sz="1600" dirty="0"/>
+              <a:t>matrix </a:t>
+            </a:r>
+            <a:r>
+              <a:rPr lang="en-US" sz="1600" dirty="0" smtClean="0"/>
+              <a:t>reduced to 2 independent quantities</a:t>
+            </a:r>
+          </a:p>
+          <a:p>
+            <a:endParaRPr lang="en-US" sz="2200" dirty="0"/>
+          </a:p>
+          <a:p>
+            <a:pPr lvl="2"/>
+            <a:endParaRPr lang="en-US" dirty="0" smtClean="0"/>
+          </a:p>
+          <a:p>
+            <a:pPr marL="0" indent="0">
+              <a:buNone/>
+            </a:pPr>
+            <a:endParaRPr lang="en-US" dirty="0"/>
+          </a:p>
+        </p:txBody>
+      </p:sp>
+      <p:sp>
+        <p:nvSpPr>
+          <p:cNvPr id="9" name="Curved Right Arrow 8"/>
+          <p:cNvSpPr/>
+          <p:nvPr/>
+        </p:nvSpPr>
+        <p:spPr bwMode="auto">
+          <a:xfrm rot="16200000" flipH="1">
+            <a:off x="3839866" y="1630333"/>
+            <a:ext cx="391997" cy="1272047"/>
+          </a:xfrm>
+          <a:prstGeom prst="curvedRightArrow">
+            <a:avLst/>
+          </a:prstGeom>
+          <a:solidFill>
+            <a:schemeClr val="accent1"/>
+          </a:solidFill>
+          <a:ln>
+            <a:noFill/>
+          </a:ln>
+          <a:effectLst/>
+          <a:extLst>
+            <a:ext uri="{91240B29-F687-4F45-9708-019B960494DF}">
+              <a14:hiddenLine xmlns:a14="http://schemas.microsoft.com/office/drawing/2010/main" w="9525" cap="flat" cmpd="sng" algn="ctr">
+                <a:solidFill>
+                  <a:schemeClr val="tx1"/>
+                </a:solidFill>
+                <a:prstDash val="solid"/>
+                <a:round/>
+                <a:headEnd type="none" w="med" len="med"/>
+                <a:tailEnd type="none" w="med" len="med"/>
+              </a14:hiddenLine>
+            </a:ext>
+            <a:ext uri="{AF507438-7753-43E0-B8FC-AC1667EBCBE1}">
+              <a14:hiddenEffects xmlns:a14="http://schemas.microsoft.com/office/drawing/2010/main">
+                <a:effectLst>
+                  <a:outerShdw dist="35921" dir="2700000" algn="ctr" rotWithShape="0">
+                    <a:schemeClr val="bg2"/>
+                  </a:outerShdw>
+                </a:effectLst>
+              </a14:hiddenEffects>
+            </a:ext>
+          </a:extLst>
+        </p:spPr>
+        <p:txBody>
+          <a:bodyPr vert="horz" wrap="square" lIns="91440" tIns="45720" rIns="91440" bIns="45720" numCol="1" rtlCol="0" anchor="t" anchorCtr="0" compatLnSpc="1">
+            <a:prstTxWarp prst="textNoShape">
+              <a:avLst/>
+            </a:prstTxWarp>
+          </a:bodyPr>
+          <a:lstStyle/>
+          <a:p>
+            <a:pPr marL="0" marR="0" indent="0" algn="l" defTabSz="914400" rtl="0" eaLnBrk="1" fontAlgn="base" latinLnBrk="0" hangingPunct="1">
+              <a:lnSpc>
+                <a:spcPct val="100000"/>
+              </a:lnSpc>
+              <a:spcBef>
+                <a:spcPct val="50000"/>
+              </a:spcBef>
+              <a:spcAft>
+                <a:spcPct val="0"/>
+              </a:spcAft>
+              <a:buClrTx/>
+              <a:buSzTx/>
+              <a:buFontTx/>
+              <a:buNone/>
+              <a:tabLst/>
+            </a:pPr>
+            <a:endParaRPr kumimoji="0" lang="en-US" sz="1800" b="1" i="0" u="none" strike="noStrike" cap="none" normalizeH="0" baseline="0" smtClean="0">
+              <a:ln>
+                <a:noFill/>
+              </a:ln>
+              <a:solidFill>
+                <a:schemeClr val="tx1"/>
+              </a:solidFill>
+              <a:effectLst/>
+              <a:latin typeface="Arial" charset="0"/>
+            </a:endParaRPr>
+          </a:p>
+        </p:txBody>
+      </p:sp>
+      <p:sp>
+        <p:nvSpPr>
+          <p:cNvPr id="10" name="Curved Right Arrow 9"/>
+          <p:cNvSpPr/>
+          <p:nvPr/>
+        </p:nvSpPr>
+        <p:spPr bwMode="auto">
+          <a:xfrm rot="16200000" flipH="1">
+            <a:off x="5727007" y="1670818"/>
+            <a:ext cx="391997" cy="1230857"/>
+          </a:xfrm>
+          <a:prstGeom prst="curvedRightArrow">
+            <a:avLst/>
+          </a:prstGeom>
+          <a:solidFill>
+            <a:schemeClr val="accent1"/>
+          </a:solidFill>
+          <a:ln>
+            <a:noFill/>
+          </a:ln>
+          <a:effectLst/>
+          <a:extLst>
+            <a:ext uri="{91240B29-F687-4F45-9708-019B960494DF}">
+              <a14:hiddenLine xmlns:a14="http://schemas.microsoft.com/office/drawing/2010/main" w="9525" cap="flat" cmpd="sng" algn="ctr">
+                <a:solidFill>
+                  <a:schemeClr val="tx1"/>
+                </a:solidFill>
+                <a:prstDash val="solid"/>
+                <a:round/>
+                <a:headEnd type="none" w="med" len="med"/>
+                <a:tailEnd type="none" w="med" len="med"/>
+              </a14:hiddenLine>
+            </a:ext>
+            <a:ext uri="{AF507438-7753-43E0-B8FC-AC1667EBCBE1}">
+              <a14:hiddenEffects xmlns:a14="http://schemas.microsoft.com/office/drawing/2010/main">
+                <a:effectLst>
+                  <a:outerShdw dist="35921" dir="2700000" algn="ctr" rotWithShape="0">
+                    <a:schemeClr val="bg2"/>
+                  </a:outerShdw>
+                </a:effectLst>
+              </a14:hiddenEffects>
+            </a:ext>
+          </a:extLst>
+        </p:spPr>
+        <p:txBody>
+          <a:bodyPr vert="horz" wrap="square" lIns="91440" tIns="45720" rIns="91440" bIns="45720" numCol="1" rtlCol="0" anchor="t" anchorCtr="0" compatLnSpc="1">
+            <a:prstTxWarp prst="textNoShape">
+              <a:avLst/>
+            </a:prstTxWarp>
+          </a:bodyPr>
+          <a:lstStyle/>
+          <a:p>
+            <a:pPr marL="0" marR="0" indent="0" algn="l" defTabSz="914400" rtl="0" eaLnBrk="1" fontAlgn="base" latinLnBrk="0" hangingPunct="1">
+              <a:lnSpc>
+                <a:spcPct val="100000"/>
+              </a:lnSpc>
+              <a:spcBef>
+                <a:spcPct val="50000"/>
+              </a:spcBef>
+              <a:spcAft>
+                <a:spcPct val="0"/>
+              </a:spcAft>
+              <a:buClrTx/>
+              <a:buSzTx/>
+              <a:buFontTx/>
+              <a:buNone/>
+              <a:tabLst/>
+            </a:pPr>
+            <a:endParaRPr kumimoji="0" lang="en-US" sz="1800" b="1" i="0" u="none" strike="noStrike" cap="none" normalizeH="0" baseline="0" smtClean="0">
+              <a:ln>
+                <a:noFill/>
+              </a:ln>
+              <a:solidFill>
+                <a:schemeClr val="tx1"/>
+              </a:solidFill>
+              <a:effectLst/>
+              <a:latin typeface="Arial" charset="0"/>
+            </a:endParaRPr>
+          </a:p>
+        </p:txBody>
+      </p:sp>
+      <p:sp>
+        <p:nvSpPr>
+          <p:cNvPr id="11" name="TextBox 10"/>
+          <p:cNvSpPr txBox="1"/>
+          <p:nvPr/>
+        </p:nvSpPr>
+        <p:spPr>
+          <a:xfrm>
+            <a:off x="6396323" y="1877580"/>
+            <a:ext cx="453827" cy="584775"/>
+          </a:xfrm>
+          <a:prstGeom prst="rect">
+            <a:avLst/>
+          </a:prstGeom>
+          <a:noFill/>
+        </p:spPr>
+        <p:txBody>
+          <a:bodyPr wrap="square" rtlCol="0">
+            <a:spAutoFit/>
+          </a:bodyPr>
+          <a:lstStyle/>
+          <a:p>
+            <a:r>
+              <a:rPr lang="en-US" sz="3200" dirty="0" smtClean="0"/>
+              <a:t>?</a:t>
+            </a:r>
+            <a:endParaRPr lang="en-US" sz="3200" dirty="0"/>
+          </a:p>
+        </p:txBody>
+      </p:sp>
+      <p:pic>
+        <p:nvPicPr>
+          <p:cNvPr id="12" name="Picture 11"/>
+          <p:cNvPicPr>
+            <a:picLocks noChangeAspect="1"/>
+          </p:cNvPicPr>
+          <p:nvPr/>
+        </p:nvPicPr>
+        <p:blipFill>
+          <a:blip r:embed="rId2"/>
+          <a:stretch>
+            <a:fillRect/>
+          </a:stretch>
+        </p:blipFill>
+        <p:spPr>
+          <a:xfrm>
+            <a:off x="2602551" y="2462355"/>
+            <a:ext cx="4559317" cy="1886466"/>
+          </a:xfrm>
+          <a:prstGeom prst="rect">
+            <a:avLst/>
+          </a:prstGeom>
+        </p:spPr>
+      </p:pic>
     </p:spTree>
     <p:extLst>
       <p:ext uri="{BB962C8B-B14F-4D97-AF65-F5344CB8AC3E}">
@@ -44031,6 +47202,267 @@
     </a:lnDef>
   </a:objectDefaults>
   <a:extraClrSchemeLst/>
+</a:theme>
+</file>
+
+<file path=ppt/theme/theme13.xml><?xml version="1.0" encoding="utf-8"?>
+<a:theme xmlns:a="http://schemas.openxmlformats.org/drawingml/2006/main" name="Office Theme">
+  <a:themeElements>
+    <a:clrScheme name="Office">
+      <a:dk1>
+        <a:sysClr val="windowText" lastClr="000000"/>
+      </a:dk1>
+      <a:lt1>
+        <a:sysClr val="window" lastClr="FFFFFF"/>
+      </a:lt1>
+      <a:dk2>
+        <a:srgbClr val="44546A"/>
+      </a:dk2>
+      <a:lt2>
+        <a:srgbClr val="E7E6E6"/>
+      </a:lt2>
+      <a:accent1>
+        <a:srgbClr val="5B9BD5"/>
+      </a:accent1>
+      <a:accent2>
+        <a:srgbClr val="ED7D31"/>
+      </a:accent2>
+      <a:accent3>
+        <a:srgbClr val="A5A5A5"/>
+      </a:accent3>
+      <a:accent4>
+        <a:srgbClr val="FFC000"/>
+      </a:accent4>
+      <a:accent5>
+        <a:srgbClr val="4472C4"/>
+      </a:accent5>
+      <a:accent6>
+        <a:srgbClr val="70AD47"/>
+      </a:accent6>
+      <a:hlink>
+        <a:srgbClr val="0563C1"/>
+      </a:hlink>
+      <a:folHlink>
+        <a:srgbClr val="954F72"/>
+      </a:folHlink>
+    </a:clrScheme>
+    <a:fontScheme name="Office">
+      <a:majorFont>
+        <a:latin typeface="Calibri Light" panose="020F0302020204030204"/>
+        <a:ea typeface=""/>
+        <a:cs typeface=""/>
+        <a:font script="Jpan" typeface="游ゴシック Light"/>
+        <a:font script="Hang" typeface="맑은 고딕"/>
+        <a:font script="Hans" typeface="等线 Light"/>
+        <a:font script="Hant" typeface="新細明體"/>
+        <a:font script="Arab" typeface="Times New Roman"/>
+        <a:font script="Hebr" typeface="Times New Roman"/>
+        <a:font script="Thai" typeface="Angsana New"/>
+        <a:font script="Ethi" typeface="Nyala"/>
+        <a:font script="Beng" typeface="Vrinda"/>
+        <a:font script="Gujr" typeface="Shruti"/>
+        <a:font script="Khmr" typeface="MoolBoran"/>
+        <a:font script="Knda" typeface="Tunga"/>
+        <a:font script="Guru" typeface="Raavi"/>
+        <a:font script="Cans" typeface="Euphemia"/>
+        <a:font script="Cher" typeface="Plantagenet Cherokee"/>
+        <a:font script="Yiii" typeface="Microsoft Yi Baiti"/>
+        <a:font script="Tibt" typeface="Microsoft Himalaya"/>
+        <a:font script="Thaa" typeface="MV Boli"/>
+        <a:font script="Deva" typeface="Mangal"/>
+        <a:font script="Telu" typeface="Gautami"/>
+        <a:font script="Taml" typeface="Latha"/>
+        <a:font script="Syrc" typeface="Estrangelo Edessa"/>
+        <a:font script="Orya" typeface="Kalinga"/>
+        <a:font script="Mlym" typeface="Kartika"/>
+        <a:font script="Laoo" typeface="DokChampa"/>
+        <a:font script="Sinh" typeface="Iskoola Pota"/>
+        <a:font script="Mong" typeface="Mongolian Baiti"/>
+        <a:font script="Viet" typeface="Times New Roman"/>
+        <a:font script="Uigh" typeface="Microsoft Uighur"/>
+        <a:font script="Geor" typeface="Sylfaen"/>
+      </a:majorFont>
+      <a:minorFont>
+        <a:latin typeface="Calibri" panose="020F0502020204030204"/>
+        <a:ea typeface=""/>
+        <a:cs typeface=""/>
+        <a:font script="Jpan" typeface="游ゴシック"/>
+        <a:font script="Hang" typeface="맑은 고딕"/>
+        <a:font script="Hans" typeface="等线"/>
+        <a:font script="Hant" typeface="新細明體"/>
+        <a:font script="Arab" typeface="Arial"/>
+        <a:font script="Hebr" typeface="Arial"/>
+        <a:font script="Thai" typeface="Cordia New"/>
+        <a:font script="Ethi" typeface="Nyala"/>
+        <a:font script="Beng" typeface="Vrinda"/>
+        <a:font script="Gujr" typeface="Shruti"/>
+        <a:font script="Khmr" typeface="DaunPenh"/>
+        <a:font script="Knda" typeface="Tunga"/>
+        <a:font script="Guru" typeface="Raavi"/>
+        <a:font script="Cans" typeface="Euphemia"/>
+        <a:font script="Cher" typeface="Plantagenet Cherokee"/>
+        <a:font script="Yiii" typeface="Microsoft Yi Baiti"/>
+        <a:font script="Tibt" typeface="Microsoft Himalaya"/>
+        <a:font script="Thaa" typeface="MV Boli"/>
+        <a:font script="Deva" typeface="Mangal"/>
+        <a:font script="Telu" typeface="Gautami"/>
+        <a:font script="Taml" typeface="Latha"/>
+        <a:font script="Syrc" typeface="Estrangelo Edessa"/>
+        <a:font script="Orya" typeface="Kalinga"/>
+        <a:font script="Mlym" typeface="Kartika"/>
+        <a:font script="Laoo" typeface="DokChampa"/>
+        <a:font script="Sinh" typeface="Iskoola Pota"/>
+        <a:font script="Mong" typeface="Mongolian Baiti"/>
+        <a:font script="Viet" typeface="Arial"/>
+        <a:font script="Uigh" typeface="Microsoft Uighur"/>
+        <a:font script="Geor" typeface="Sylfaen"/>
+      </a:minorFont>
+    </a:fontScheme>
+    <a:fmtScheme name="Office">
+      <a:fillStyleLst>
+        <a:solidFill>
+          <a:schemeClr val="phClr"/>
+        </a:solidFill>
+        <a:gradFill rotWithShape="1">
+          <a:gsLst>
+            <a:gs pos="0">
+              <a:schemeClr val="phClr">
+                <a:lumMod val="110000"/>
+                <a:satMod val="105000"/>
+                <a:tint val="67000"/>
+              </a:schemeClr>
+            </a:gs>
+            <a:gs pos="50000">
+              <a:schemeClr val="phClr">
+                <a:lumMod val="105000"/>
+                <a:satMod val="103000"/>
+                <a:tint val="73000"/>
+              </a:schemeClr>
+            </a:gs>
+            <a:gs pos="100000">
+              <a:schemeClr val="phClr">
+                <a:lumMod val="105000"/>
+                <a:satMod val="109000"/>
+                <a:tint val="81000"/>
+              </a:schemeClr>
+            </a:gs>
+          </a:gsLst>
+          <a:lin ang="5400000" scaled="0"/>
+        </a:gradFill>
+        <a:gradFill rotWithShape="1">
+          <a:gsLst>
+            <a:gs pos="0">
+              <a:schemeClr val="phClr">
+                <a:satMod val="103000"/>
+                <a:lumMod val="102000"/>
+                <a:tint val="94000"/>
+              </a:schemeClr>
+            </a:gs>
+            <a:gs pos="50000">
+              <a:schemeClr val="phClr">
+                <a:satMod val="110000"/>
+                <a:lumMod val="100000"/>
+                <a:shade val="100000"/>
+              </a:schemeClr>
+            </a:gs>
+            <a:gs pos="100000">
+              <a:schemeClr val="phClr">
+                <a:lumMod val="99000"/>
+                <a:satMod val="120000"/>
+                <a:shade val="78000"/>
+              </a:schemeClr>
+            </a:gs>
+          </a:gsLst>
+          <a:lin ang="5400000" scaled="0"/>
+        </a:gradFill>
+      </a:fillStyleLst>
+      <a:lnStyleLst>
+        <a:ln w="6350" cap="flat" cmpd="sng" algn="ctr">
+          <a:solidFill>
+            <a:schemeClr val="phClr"/>
+          </a:solidFill>
+          <a:prstDash val="solid"/>
+          <a:miter lim="800000"/>
+        </a:ln>
+        <a:ln w="12700" cap="flat" cmpd="sng" algn="ctr">
+          <a:solidFill>
+            <a:schemeClr val="phClr"/>
+          </a:solidFill>
+          <a:prstDash val="solid"/>
+          <a:miter lim="800000"/>
+        </a:ln>
+        <a:ln w="19050" cap="flat" cmpd="sng" algn="ctr">
+          <a:solidFill>
+            <a:schemeClr val="phClr"/>
+          </a:solidFill>
+          <a:prstDash val="solid"/>
+          <a:miter lim="800000"/>
+        </a:ln>
+      </a:lnStyleLst>
+      <a:effectStyleLst>
+        <a:effectStyle>
+          <a:effectLst/>
+        </a:effectStyle>
+        <a:effectStyle>
+          <a:effectLst/>
+        </a:effectStyle>
+        <a:effectStyle>
+          <a:effectLst>
+            <a:outerShdw blurRad="57150" dist="19050" dir="5400000" algn="ctr" rotWithShape="0">
+              <a:srgbClr val="000000">
+                <a:alpha val="63000"/>
+              </a:srgbClr>
+            </a:outerShdw>
+          </a:effectLst>
+        </a:effectStyle>
+      </a:effectStyleLst>
+      <a:bgFillStyleLst>
+        <a:solidFill>
+          <a:schemeClr val="phClr"/>
+        </a:solidFill>
+        <a:solidFill>
+          <a:schemeClr val="phClr">
+            <a:tint val="95000"/>
+            <a:satMod val="170000"/>
+          </a:schemeClr>
+        </a:solidFill>
+        <a:gradFill rotWithShape="1">
+          <a:gsLst>
+            <a:gs pos="0">
+              <a:schemeClr val="phClr">
+                <a:tint val="93000"/>
+                <a:satMod val="150000"/>
+                <a:shade val="98000"/>
+                <a:lumMod val="102000"/>
+              </a:schemeClr>
+            </a:gs>
+            <a:gs pos="50000">
+              <a:schemeClr val="phClr">
+                <a:tint val="98000"/>
+                <a:satMod val="130000"/>
+                <a:shade val="90000"/>
+                <a:lumMod val="103000"/>
+              </a:schemeClr>
+            </a:gs>
+            <a:gs pos="100000">
+              <a:schemeClr val="phClr">
+                <a:shade val="63000"/>
+                <a:satMod val="120000"/>
+              </a:schemeClr>
+            </a:gs>
+          </a:gsLst>
+          <a:lin ang="5400000" scaled="0"/>
+        </a:gradFill>
+      </a:bgFillStyleLst>
+    </a:fmtScheme>
+  </a:themeElements>
+  <a:objectDefaults/>
+  <a:extraClrSchemeLst/>
+  <a:extLst>
+    <a:ext uri="{05A4C25C-085E-4340-85A3-A5531E510DB2}">
+      <thm15:themeFamily xmlns:thm15="http://schemas.microsoft.com/office/thememl/2012/main" name="Office Theme" id="{62F939B6-93AF-4DB8-9C6B-D6C7DFDC589F}" vid="{4A3C46E8-61CC-4603-A589-7422A47A8E4A}"/>
+    </a:ext>
+  </a:extLst>
 </a:theme>
 </file>
 

</xml_diff>